<commit_message>
changes to figure 1 and 3
</commit_message>
<xml_diff>
--- a/figures/figure-small-example/figure3-cycle.pptx
+++ b/figures/figure-small-example/figure3-cycle.pptx
@@ -110,7 +110,7 @@
   <p:extLst>
     <p:ext uri="{EFAFB233-063F-42B5-8137-9DF3F51BA10A}">
       <p15:sldGuideLst xmlns:p15="http://schemas.microsoft.com/office/powerpoint/2012/main">
-        <p15:guide id="1" orient="horz" pos="2448" userDrawn="1">
+        <p15:guide id="1" orient="horz" pos="2664" userDrawn="1">
           <p15:clr>
             <a:srgbClr val="A4A3A4"/>
           </p15:clr>
@@ -3437,184 +3437,41 @@
           <a:chExt cx="0" cy="0"/>
         </a:xfrm>
       </p:grpSpPr>
-      <p:grpSp>
-        <p:nvGrpSpPr>
-          <p:cNvPr id="244" name="Group 243">
+      <p:pic>
+        <p:nvPicPr>
+          <p:cNvPr id="435" name="Graphic 434">
             <a:extLst>
               <a:ext uri="{FF2B5EF4-FFF2-40B4-BE49-F238E27FC236}">
-                <a16:creationId xmlns:a16="http://schemas.microsoft.com/office/drawing/2014/main" id="{A3CBB9D5-F156-693C-5402-B758A671742C}"/>
+                <a16:creationId xmlns:a16="http://schemas.microsoft.com/office/drawing/2014/main" id="{9371329F-8AE2-2E7F-CBEF-69D677E5E749}"/>
               </a:ext>
             </a:extLst>
           </p:cNvPr>
-          <p:cNvGrpSpPr/>
+          <p:cNvPicPr>
+            <a:picLocks noChangeAspect="1"/>
+          </p:cNvPicPr>
           <p:nvPr/>
-        </p:nvGrpSpPr>
-        <p:grpSpPr>
+        </p:nvPicPr>
+        <p:blipFill rotWithShape="1">
+          <a:blip r:embed="rId3">
+            <a:extLst>
+              <a:ext uri="{96DAC541-7B7A-43D3-8B79-37D633B846F1}">
+                <asvg:svgBlip xmlns:asvg="http://schemas.microsoft.com/office/drawing/2016/SVG/main" r:embed="rId4"/>
+              </a:ext>
+            </a:extLst>
+          </a:blip>
+          <a:srcRect l="35103" t="4047" b="17202"/>
+          <a:stretch/>
+        </p:blipFill>
+        <p:spPr>
           <a:xfrm>
-            <a:off x="1330937" y="5478740"/>
-            <a:ext cx="3445853" cy="2149141"/>
-            <a:chOff x="1678492" y="5533956"/>
-            <a:chExt cx="3445853" cy="2149141"/>
+            <a:off x="1914018" y="5625089"/>
+            <a:ext cx="3324883" cy="1911150"/>
           </a:xfrm>
-        </p:grpSpPr>
-        <p:pic>
-          <p:nvPicPr>
-            <p:cNvPr id="152" name="Graphic 151">
-              <a:extLst>
-                <a:ext uri="{FF2B5EF4-FFF2-40B4-BE49-F238E27FC236}">
-                  <a16:creationId xmlns:a16="http://schemas.microsoft.com/office/drawing/2014/main" id="{2F8D328A-06B2-8FB0-006C-29E7D2076E52}"/>
-                </a:ext>
-              </a:extLst>
-            </p:cNvPr>
-            <p:cNvPicPr>
-              <a:picLocks noChangeAspect="1"/>
-            </p:cNvPicPr>
-            <p:nvPr/>
-          </p:nvPicPr>
-          <p:blipFill rotWithShape="1">
-            <a:blip r:embed="rId3">
-              <a:extLst>
-                <a:ext uri="{96DAC541-7B7A-43D3-8B79-37D633B846F1}">
-                  <asvg:svgBlip xmlns:asvg="http://schemas.microsoft.com/office/drawing/2016/SVG/main" r:embed="rId4"/>
-                </a:ext>
-              </a:extLst>
-            </a:blip>
-            <a:srcRect l="4808" t="87001" b="1988"/>
-            <a:stretch/>
-          </p:blipFill>
-          <p:spPr>
-            <a:xfrm>
-              <a:off x="1851459" y="7388591"/>
-              <a:ext cx="3161615" cy="274286"/>
-            </a:xfrm>
-            <a:prstGeom prst="rect">
-              <a:avLst/>
-            </a:prstGeom>
-          </p:spPr>
-        </p:pic>
-        <p:pic>
-          <p:nvPicPr>
-            <p:cNvPr id="153" name="Graphic 152">
-              <a:extLst>
-                <a:ext uri="{FF2B5EF4-FFF2-40B4-BE49-F238E27FC236}">
-                  <a16:creationId xmlns:a16="http://schemas.microsoft.com/office/drawing/2014/main" id="{FC9558E9-351A-C350-ED8B-B946132F6D41}"/>
-                </a:ext>
-              </a:extLst>
-            </p:cNvPr>
-            <p:cNvPicPr>
-              <a:picLocks noChangeAspect="1"/>
-            </p:cNvPicPr>
-            <p:nvPr/>
-          </p:nvPicPr>
-          <p:blipFill rotWithShape="1">
-            <a:blip r:embed="rId5">
-              <a:extLst>
-                <a:ext uri="{96DAC541-7B7A-43D3-8B79-37D633B846F1}">
-                  <asvg:svgBlip xmlns:asvg="http://schemas.microsoft.com/office/drawing/2016/SVG/main" r:embed="rId6"/>
-                </a:ext>
-              </a:extLst>
-            </a:blip>
-            <a:srcRect l="4260" b="22304"/>
-            <a:stretch/>
-          </p:blipFill>
-          <p:spPr>
-            <a:xfrm>
-              <a:off x="1832776" y="5533956"/>
-              <a:ext cx="3179802" cy="1935401"/>
-            </a:xfrm>
-            <a:prstGeom prst="rect">
-              <a:avLst/>
-            </a:prstGeom>
-          </p:spPr>
-        </p:pic>
-        <p:sp>
-          <p:nvSpPr>
-            <p:cNvPr id="86" name="Rounded Rectangle 85">
-              <a:extLst>
-                <a:ext uri="{FF2B5EF4-FFF2-40B4-BE49-F238E27FC236}">
-                  <a16:creationId xmlns:a16="http://schemas.microsoft.com/office/drawing/2014/main" id="{4DE9DCC5-B012-AA02-DCB2-438EF505EA39}"/>
-                </a:ext>
-              </a:extLst>
-            </p:cNvPr>
-            <p:cNvSpPr/>
-            <p:nvPr/>
-          </p:nvSpPr>
-          <p:spPr>
-            <a:xfrm>
-              <a:off x="1740317" y="5669480"/>
-              <a:ext cx="3384028" cy="2013617"/>
-            </a:xfrm>
-            <a:prstGeom prst="roundRect">
-              <a:avLst/>
-            </a:prstGeom>
-            <a:noFill/>
-            <a:ln w="19050">
-              <a:solidFill>
-                <a:schemeClr val="tx1"/>
-              </a:solidFill>
-            </a:ln>
-          </p:spPr>
-          <p:style>
-            <a:lnRef idx="2">
-              <a:schemeClr val="accent1">
-                <a:shade val="15000"/>
-              </a:schemeClr>
-            </a:lnRef>
-            <a:fillRef idx="1">
-              <a:schemeClr val="accent1"/>
-            </a:fillRef>
-            <a:effectRef idx="0">
-              <a:schemeClr val="accent1"/>
-            </a:effectRef>
-            <a:fontRef idx="minor">
-              <a:schemeClr val="lt1"/>
-            </a:fontRef>
-          </p:style>
-          <p:txBody>
-            <a:bodyPr rtlCol="0" anchor="ctr"/>
-            <a:lstStyle/>
-            <a:p>
-              <a:pPr algn="ctr"/>
-              <a:endParaRPr lang="en-US"/>
-            </a:p>
-          </p:txBody>
-        </p:sp>
-        <p:sp>
-          <p:nvSpPr>
-            <p:cNvPr id="10" name="TextBox 9">
-              <a:extLst>
-                <a:ext uri="{FF2B5EF4-FFF2-40B4-BE49-F238E27FC236}">
-                  <a16:creationId xmlns:a16="http://schemas.microsoft.com/office/drawing/2014/main" id="{ECF17904-C6D1-B3F6-B1DF-7CF18E61DB19}"/>
-                </a:ext>
-              </a:extLst>
-            </p:cNvPr>
-            <p:cNvSpPr txBox="1"/>
-            <p:nvPr/>
-          </p:nvSpPr>
-          <p:spPr>
-            <a:xfrm>
-              <a:off x="1678492" y="5920897"/>
-              <a:ext cx="303288" cy="276999"/>
-            </a:xfrm>
-            <a:prstGeom prst="rect">
-              <a:avLst/>
-            </a:prstGeom>
-            <a:noFill/>
-          </p:spPr>
-          <p:txBody>
-            <a:bodyPr wrap="none" rtlCol="0">
-              <a:spAutoFit/>
-            </a:bodyPr>
-            <a:lstStyle/>
-            <a:p>
-              <a:r>
-                <a:rPr lang="en-US" sz="1200" dirty="0"/>
-                <a:t>g)</a:t>
-              </a:r>
-            </a:p>
-          </p:txBody>
-        </p:sp>
-      </p:grpSp>
+          <a:prstGeom prst="rect">
+            <a:avLst/>
+          </a:prstGeom>
+        </p:spPr>
+      </p:pic>
       <p:pic>
         <p:nvPicPr>
           <p:cNvPr id="177" name="Picture 176" descr="A picture containing sketch, drawing, circle, black and white&#10;&#10;Description automatically generated">
@@ -3630,16 +3487,16 @@
           <p:nvPr/>
         </p:nvPicPr>
         <p:blipFill rotWithShape="1">
-          <a:blip r:embed="rId7">
+          <a:blip r:embed="rId5">
             <a:alphaModFix amt="40000"/>
           </a:blip>
-          <a:srcRect t="429" r="-1705" b="6173"/>
+          <a:srcRect t="5822" r="-1705" b="212"/>
           <a:stretch/>
         </p:blipFill>
         <p:spPr>
           <a:xfrm>
-            <a:off x="3057134" y="1340313"/>
-            <a:ext cx="3150143" cy="4092640"/>
+            <a:off x="3086930" y="1322615"/>
+            <a:ext cx="3150143" cy="4117532"/>
           </a:xfrm>
           <a:prstGeom prst="rect">
             <a:avLst/>
@@ -3661,7 +3518,7 @@
           <p:nvPr/>
         </p:nvPicPr>
         <p:blipFill rotWithShape="1">
-          <a:blip r:embed="rId7">
+          <a:blip r:embed="rId5">
             <a:grayscl/>
             <a:alphaModFix amt="40000"/>
           </a:blip>
@@ -3670,7 +3527,7 @@
         </p:blipFill>
         <p:spPr>
           <a:xfrm>
-            <a:off x="36231" y="1325991"/>
+            <a:off x="36231" y="1319641"/>
             <a:ext cx="3142105" cy="4106963"/>
           </a:xfrm>
           <a:prstGeom prst="rect">
@@ -3683,6 +3540,180 @@
           </a:effectLst>
         </p:spPr>
       </p:pic>
+      <p:pic>
+        <p:nvPicPr>
+          <p:cNvPr id="397" name="Graphic 396">
+            <a:extLst>
+              <a:ext uri="{FF2B5EF4-FFF2-40B4-BE49-F238E27FC236}">
+                <a16:creationId xmlns:a16="http://schemas.microsoft.com/office/drawing/2014/main" id="{C1B092BE-3E84-4580-183A-DC9E09D96C52}"/>
+              </a:ext>
+            </a:extLst>
+          </p:cNvPr>
+          <p:cNvPicPr>
+            <a:picLocks noChangeAspect="1"/>
+          </p:cNvPicPr>
+          <p:nvPr/>
+        </p:nvPicPr>
+        <p:blipFill rotWithShape="1">
+          <a:blip r:embed="rId6">
+            <a:extLst>
+              <a:ext uri="{96DAC541-7B7A-43D3-8B79-37D633B846F1}">
+                <asvg:svgBlip xmlns:asvg="http://schemas.microsoft.com/office/drawing/2016/SVG/main" r:embed="rId7"/>
+              </a:ext>
+            </a:extLst>
+          </a:blip>
+          <a:srcRect r="64697" b="18115"/>
+          <a:stretch/>
+        </p:blipFill>
+        <p:spPr>
+          <a:xfrm>
+            <a:off x="21413" y="5729524"/>
+            <a:ext cx="1963625" cy="2157455"/>
+          </a:xfrm>
+          <a:prstGeom prst="rect">
+            <a:avLst/>
+          </a:prstGeom>
+        </p:spPr>
+      </p:pic>
+      <p:sp>
+        <p:nvSpPr>
+          <p:cNvPr id="73" name="Rectangle 72">
+            <a:extLst>
+              <a:ext uri="{FF2B5EF4-FFF2-40B4-BE49-F238E27FC236}">
+                <a16:creationId xmlns:a16="http://schemas.microsoft.com/office/drawing/2014/main" id="{90A725AA-3622-1D85-A8FA-5435CD9F38D7}"/>
+              </a:ext>
+            </a:extLst>
+          </p:cNvPr>
+          <p:cNvSpPr/>
+          <p:nvPr/>
+        </p:nvSpPr>
+        <p:spPr>
+          <a:xfrm>
+            <a:off x="4374880" y="31228"/>
+            <a:ext cx="2455597" cy="1139252"/>
+          </a:xfrm>
+          <a:prstGeom prst="rect">
+            <a:avLst/>
+          </a:prstGeom>
+          <a:noFill/>
+          <a:ln w="19050">
+            <a:solidFill>
+              <a:schemeClr val="tx1"/>
+            </a:solidFill>
+          </a:ln>
+        </p:spPr>
+        <p:style>
+          <a:lnRef idx="2">
+            <a:schemeClr val="accent1">
+              <a:shade val="15000"/>
+            </a:schemeClr>
+          </a:lnRef>
+          <a:fillRef idx="1">
+            <a:schemeClr val="accent1"/>
+          </a:fillRef>
+          <a:effectRef idx="0">
+            <a:schemeClr val="accent1"/>
+          </a:effectRef>
+          <a:fontRef idx="minor">
+            <a:schemeClr val="lt1"/>
+          </a:fontRef>
+        </p:style>
+        <p:txBody>
+          <a:bodyPr rtlCol="0" anchor="ctr"/>
+          <a:lstStyle/>
+          <a:p>
+            <a:pPr algn="ctr"/>
+            <a:endParaRPr lang="en-US"/>
+          </a:p>
+        </p:txBody>
+      </p:sp>
+      <p:sp>
+        <p:nvSpPr>
+          <p:cNvPr id="74" name="Rectangle 73">
+            <a:extLst>
+              <a:ext uri="{FF2B5EF4-FFF2-40B4-BE49-F238E27FC236}">
+                <a16:creationId xmlns:a16="http://schemas.microsoft.com/office/drawing/2014/main" id="{75547A15-F9B7-A8C0-50AE-E7A1CB9DACBE}"/>
+              </a:ext>
+            </a:extLst>
+          </p:cNvPr>
+          <p:cNvSpPr/>
+          <p:nvPr/>
+        </p:nvSpPr>
+        <p:spPr>
+          <a:xfrm>
+            <a:off x="28190" y="1310933"/>
+            <a:ext cx="6147120" cy="4122021"/>
+          </a:xfrm>
+          <a:prstGeom prst="rect">
+            <a:avLst/>
+          </a:prstGeom>
+          <a:noFill/>
+          <a:ln w="19050">
+            <a:solidFill>
+              <a:schemeClr val="tx1"/>
+            </a:solidFill>
+          </a:ln>
+        </p:spPr>
+        <p:style>
+          <a:lnRef idx="2">
+            <a:schemeClr val="accent1">
+              <a:shade val="15000"/>
+            </a:schemeClr>
+          </a:lnRef>
+          <a:fillRef idx="1">
+            <a:schemeClr val="accent1"/>
+          </a:fillRef>
+          <a:effectRef idx="0">
+            <a:schemeClr val="accent1"/>
+          </a:effectRef>
+          <a:fontRef idx="minor">
+            <a:schemeClr val="lt1"/>
+          </a:fontRef>
+        </p:style>
+        <p:txBody>
+          <a:bodyPr rtlCol="0" anchor="ctr"/>
+          <a:lstStyle/>
+          <a:p>
+            <a:pPr algn="ctr"/>
+            <a:endParaRPr lang="en-US"/>
+          </a:p>
+        </p:txBody>
+      </p:sp>
+      <p:sp>
+        <p:nvSpPr>
+          <p:cNvPr id="10" name="TextBox 9">
+            <a:extLst>
+              <a:ext uri="{FF2B5EF4-FFF2-40B4-BE49-F238E27FC236}">
+                <a16:creationId xmlns:a16="http://schemas.microsoft.com/office/drawing/2014/main" id="{ECF17904-C6D1-B3F6-B1DF-7CF18E61DB19}"/>
+              </a:ext>
+            </a:extLst>
+          </p:cNvPr>
+          <p:cNvSpPr txBox="1"/>
+          <p:nvPr/>
+        </p:nvSpPr>
+        <p:spPr>
+          <a:xfrm>
+            <a:off x="287585" y="5642944"/>
+            <a:ext cx="303288" cy="276999"/>
+          </a:xfrm>
+          <a:prstGeom prst="rect">
+            <a:avLst/>
+          </a:prstGeom>
+          <a:noFill/>
+        </p:spPr>
+        <p:txBody>
+          <a:bodyPr wrap="none" rtlCol="0">
+            <a:spAutoFit/>
+          </a:bodyPr>
+          <a:lstStyle/>
+          <a:p>
+            <a:r>
+              <a:rPr lang="en-US" sz="1200" dirty="0"/>
+              <a:t>g)</a:t>
+            </a:r>
+          </a:p>
+        </p:txBody>
+      </p:sp>
       <p:grpSp>
         <p:nvGrpSpPr>
           <p:cNvPr id="298" name="Group 297">
@@ -3786,110 +3817,6 @@
           </p:spPr>
         </p:pic>
       </p:grpSp>
-      <p:sp>
-        <p:nvSpPr>
-          <p:cNvPr id="73" name="Rectangle 72">
-            <a:extLst>
-              <a:ext uri="{FF2B5EF4-FFF2-40B4-BE49-F238E27FC236}">
-                <a16:creationId xmlns:a16="http://schemas.microsoft.com/office/drawing/2014/main" id="{90A725AA-3622-1D85-A8FA-5435CD9F38D7}"/>
-              </a:ext>
-            </a:extLst>
-          </p:cNvPr>
-          <p:cNvSpPr/>
-          <p:nvPr/>
-        </p:nvSpPr>
-        <p:spPr>
-          <a:xfrm>
-            <a:off x="4374880" y="31228"/>
-            <a:ext cx="2455597" cy="1139252"/>
-          </a:xfrm>
-          <a:prstGeom prst="rect">
-            <a:avLst/>
-          </a:prstGeom>
-          <a:noFill/>
-          <a:ln w="19050">
-            <a:solidFill>
-              <a:schemeClr val="tx1"/>
-            </a:solidFill>
-          </a:ln>
-        </p:spPr>
-        <p:style>
-          <a:lnRef idx="2">
-            <a:schemeClr val="accent1">
-              <a:shade val="15000"/>
-            </a:schemeClr>
-          </a:lnRef>
-          <a:fillRef idx="1">
-            <a:schemeClr val="accent1"/>
-          </a:fillRef>
-          <a:effectRef idx="0">
-            <a:schemeClr val="accent1"/>
-          </a:effectRef>
-          <a:fontRef idx="minor">
-            <a:schemeClr val="lt1"/>
-          </a:fontRef>
-        </p:style>
-        <p:txBody>
-          <a:bodyPr rtlCol="0" anchor="ctr"/>
-          <a:lstStyle/>
-          <a:p>
-            <a:pPr algn="ctr"/>
-            <a:endParaRPr lang="en-US"/>
-          </a:p>
-        </p:txBody>
-      </p:sp>
-      <p:sp>
-        <p:nvSpPr>
-          <p:cNvPr id="74" name="Rectangle 73">
-            <a:extLst>
-              <a:ext uri="{FF2B5EF4-FFF2-40B4-BE49-F238E27FC236}">
-                <a16:creationId xmlns:a16="http://schemas.microsoft.com/office/drawing/2014/main" id="{75547A15-F9B7-A8C0-50AE-E7A1CB9DACBE}"/>
-              </a:ext>
-            </a:extLst>
-          </p:cNvPr>
-          <p:cNvSpPr/>
-          <p:nvPr/>
-        </p:nvSpPr>
-        <p:spPr>
-          <a:xfrm>
-            <a:off x="28190" y="1310933"/>
-            <a:ext cx="6147120" cy="4122021"/>
-          </a:xfrm>
-          <a:prstGeom prst="rect">
-            <a:avLst/>
-          </a:prstGeom>
-          <a:noFill/>
-          <a:ln w="19050">
-            <a:solidFill>
-              <a:schemeClr val="tx1"/>
-            </a:solidFill>
-          </a:ln>
-        </p:spPr>
-        <p:style>
-          <a:lnRef idx="2">
-            <a:schemeClr val="accent1">
-              <a:shade val="15000"/>
-            </a:schemeClr>
-          </a:lnRef>
-          <a:fillRef idx="1">
-            <a:schemeClr val="accent1"/>
-          </a:fillRef>
-          <a:effectRef idx="0">
-            <a:schemeClr val="accent1"/>
-          </a:effectRef>
-          <a:fontRef idx="minor">
-            <a:schemeClr val="lt1"/>
-          </a:fontRef>
-        </p:style>
-        <p:txBody>
-          <a:bodyPr rtlCol="0" anchor="ctr"/>
-          <a:lstStyle/>
-          <a:p>
-            <a:pPr algn="ctr"/>
-            <a:endParaRPr lang="en-US"/>
-          </a:p>
-        </p:txBody>
-      </p:sp>
       <p:cxnSp>
         <p:nvCxnSpPr>
           <p:cNvPr id="146" name="Straight Arrow Connector 145">
@@ -3996,7 +3923,7 @@
         </p:nvSpPr>
         <p:spPr>
           <a:xfrm>
-            <a:off x="2396940" y="92011"/>
+            <a:off x="2404357" y="9092"/>
             <a:ext cx="311304" cy="276999"/>
           </a:xfrm>
           <a:prstGeom prst="rect">
@@ -4031,7 +3958,7 @@
         </p:nvSpPr>
         <p:spPr>
           <a:xfrm>
-            <a:off x="-8952" y="1298043"/>
+            <a:off x="-8952" y="1285343"/>
             <a:ext cx="296876" cy="276999"/>
           </a:xfrm>
           <a:prstGeom prst="rect">
@@ -4066,7 +3993,7 @@
         </p:nvSpPr>
         <p:spPr>
           <a:xfrm>
-            <a:off x="4372430" y="5782"/>
+            <a:off x="4312838" y="-6918"/>
             <a:ext cx="311304" cy="276999"/>
           </a:xfrm>
           <a:prstGeom prst="rect">
@@ -4101,7 +4028,7 @@
         </p:nvGrpSpPr>
         <p:grpSpPr>
           <a:xfrm>
-            <a:off x="6005771" y="5855749"/>
+            <a:off x="6005771" y="5879195"/>
             <a:ext cx="825034" cy="285030"/>
             <a:chOff x="5549921" y="5892083"/>
             <a:chExt cx="825034" cy="285030"/>
@@ -4209,7 +4136,7 @@
         </p:nvGrpSpPr>
         <p:grpSpPr>
           <a:xfrm>
-            <a:off x="423194" y="5102959"/>
+            <a:off x="423194" y="5149851"/>
             <a:ext cx="1395645" cy="360891"/>
             <a:chOff x="458363" y="5173297"/>
             <a:chExt cx="1395645" cy="360891"/>
@@ -4231,8 +4158,8 @@
           </p:nvCxnSpPr>
           <p:spPr>
             <a:xfrm>
-              <a:off x="458363" y="5188320"/>
-              <a:ext cx="829183" cy="199134"/>
+              <a:off x="458363" y="5220202"/>
+              <a:ext cx="829183" cy="167252"/>
             </a:xfrm>
             <a:prstGeom prst="line">
               <a:avLst/>
@@ -4343,10 +4270,10 @@
         </p:nvGrpSpPr>
         <p:grpSpPr>
           <a:xfrm>
-            <a:off x="4291945" y="5125207"/>
-            <a:ext cx="1461793" cy="443563"/>
-            <a:chOff x="322996" y="3282958"/>
-            <a:chExt cx="1461793" cy="443563"/>
+            <a:off x="4352325" y="5183907"/>
+            <a:ext cx="1410468" cy="384863"/>
+            <a:chOff x="383376" y="3341658"/>
+            <a:chExt cx="1410468" cy="384863"/>
           </a:xfrm>
         </p:grpSpPr>
         <p:cxnSp>
@@ -4365,8 +4292,8 @@
           </p:nvCxnSpPr>
           <p:spPr>
             <a:xfrm flipH="1" flipV="1">
-              <a:off x="322996" y="3282958"/>
-              <a:ext cx="495711" cy="220972"/>
+              <a:off x="383376" y="3341658"/>
+              <a:ext cx="435331" cy="162272"/>
             </a:xfrm>
             <a:prstGeom prst="line">
               <a:avLst/>
@@ -4404,8 +4331,8 @@
           </p:nvCxnSpPr>
           <p:spPr>
             <a:xfrm flipV="1">
-              <a:off x="828982" y="3295334"/>
-              <a:ext cx="955807" cy="200257"/>
+              <a:off x="828982" y="3341658"/>
+              <a:ext cx="964862" cy="153933"/>
             </a:xfrm>
             <a:prstGeom prst="line">
               <a:avLst/>
@@ -4477,10 +4404,10 @@
         </p:nvGrpSpPr>
         <p:grpSpPr>
           <a:xfrm>
-            <a:off x="369563" y="33086"/>
-            <a:ext cx="1437818" cy="920780"/>
-            <a:chOff x="-29019" y="33086"/>
-            <a:chExt cx="1437818" cy="920780"/>
+            <a:off x="369563" y="-1980"/>
+            <a:ext cx="1437818" cy="955846"/>
+            <a:chOff x="-29019" y="-1980"/>
+            <a:chExt cx="1437818" cy="955846"/>
           </a:xfrm>
         </p:grpSpPr>
         <p:sp>
@@ -4549,7 +4476,7 @@
           </p:nvSpPr>
           <p:spPr>
             <a:xfrm>
-              <a:off x="-29019" y="93270"/>
+              <a:off x="-29019" y="-1980"/>
               <a:ext cx="304892" cy="276999"/>
             </a:xfrm>
             <a:prstGeom prst="rect">
@@ -4824,7 +4751,7 @@
         </p:nvSpPr>
         <p:spPr>
           <a:xfrm>
-            <a:off x="4182504" y="3933254"/>
+            <a:off x="4172180" y="3976450"/>
             <a:ext cx="1710100" cy="1162573"/>
           </a:xfrm>
           <a:prstGeom prst="roundRect">
@@ -5176,7 +5103,7 @@
         </p:nvGrpSpPr>
         <p:grpSpPr>
           <a:xfrm>
-            <a:off x="5987583" y="6474338"/>
+            <a:off x="5987583" y="6509507"/>
             <a:ext cx="845685" cy="304328"/>
             <a:chOff x="5540232" y="6456971"/>
             <a:chExt cx="845685" cy="304328"/>
@@ -5383,7 +5310,7 @@
         </p:nvSpPr>
         <p:spPr>
           <a:xfrm>
-            <a:off x="228629" y="3894600"/>
+            <a:off x="206648" y="3976450"/>
             <a:ext cx="1710100" cy="1162573"/>
           </a:xfrm>
           <a:prstGeom prst="roundRect">
@@ -5509,53 +5436,6 @@
       </p:sp>
       <p:cxnSp>
         <p:nvCxnSpPr>
-          <p:cNvPr id="233" name="Straight Arrow Connector 232">
-            <a:extLst>
-              <a:ext uri="{FF2B5EF4-FFF2-40B4-BE49-F238E27FC236}">
-                <a16:creationId xmlns:a16="http://schemas.microsoft.com/office/drawing/2014/main" id="{9CD0644A-A289-D356-AF63-26E6F2AA8640}"/>
-              </a:ext>
-            </a:extLst>
-          </p:cNvPr>
-          <p:cNvCxnSpPr>
-            <a:cxnSpLocks/>
-            <a:stCxn id="162" idx="1"/>
-            <a:endCxn id="86" idx="3"/>
-          </p:cNvCxnSpPr>
-          <p:nvPr/>
-        </p:nvCxnSpPr>
-        <p:spPr>
-          <a:xfrm flipH="1">
-            <a:off x="4776790" y="6616853"/>
-            <a:ext cx="1231444" cy="4220"/>
-          </a:xfrm>
-          <a:prstGeom prst="straightConnector1">
-            <a:avLst/>
-          </a:prstGeom>
-          <a:ln w="19050">
-            <a:solidFill>
-              <a:schemeClr val="tx1"/>
-            </a:solidFill>
-            <a:headEnd type="oval"/>
-            <a:tailEnd type="arrow"/>
-          </a:ln>
-        </p:spPr>
-        <p:style>
-          <a:lnRef idx="1">
-            <a:schemeClr val="accent1"/>
-          </a:lnRef>
-          <a:fillRef idx="0">
-            <a:schemeClr val="accent1"/>
-          </a:fillRef>
-          <a:effectRef idx="0">
-            <a:schemeClr val="accent1"/>
-          </a:effectRef>
-          <a:fontRef idx="minor">
-            <a:schemeClr val="tx1"/>
-          </a:fontRef>
-        </p:style>
-      </p:cxnSp>
-      <p:cxnSp>
-        <p:nvCxnSpPr>
           <p:cNvPr id="238" name="Elbow Connector 237">
             <a:extLst>
               <a:ext uri="{FF2B5EF4-FFF2-40B4-BE49-F238E27FC236}">
@@ -5573,7 +5453,7 @@
         <p:spPr>
           <a:xfrm>
             <a:off x="6175310" y="3371944"/>
-            <a:ext cx="242978" cy="2487820"/>
+            <a:ext cx="242978" cy="2511266"/>
           </a:xfrm>
           <a:prstGeom prst="bentConnector2">
             <a:avLst/>
@@ -5618,7 +5498,7 @@
         </p:nvCxnSpPr>
         <p:spPr>
           <a:xfrm>
-            <a:off x="6418288" y="6142680"/>
+            <a:off x="6418288" y="6177849"/>
             <a:ext cx="2463" cy="331658"/>
           </a:xfrm>
           <a:prstGeom prst="straightConnector1">
@@ -5661,10 +5541,10 @@
         </p:nvGrpSpPr>
         <p:grpSpPr>
           <a:xfrm>
-            <a:off x="2341402" y="5109103"/>
-            <a:ext cx="1503510" cy="463766"/>
-            <a:chOff x="-431256" y="3304030"/>
-            <a:chExt cx="1503510" cy="463766"/>
+            <a:off x="2417057" y="5109103"/>
+            <a:ext cx="1427855" cy="470116"/>
+            <a:chOff x="-355601" y="3304030"/>
+            <a:chExt cx="1427855" cy="470116"/>
           </a:xfrm>
         </p:grpSpPr>
         <p:cxnSp>
@@ -5683,8 +5563,8 @@
           </p:nvCxnSpPr>
           <p:spPr>
             <a:xfrm flipH="1" flipV="1">
-              <a:off x="-431256" y="3334926"/>
-              <a:ext cx="1256487" cy="206180"/>
+              <a:off x="-355601" y="3394365"/>
+              <a:ext cx="1180832" cy="146741"/>
             </a:xfrm>
             <a:prstGeom prst="line">
               <a:avLst/>
@@ -5759,7 +5639,7 @@
           </p:nvSpPr>
           <p:spPr>
             <a:xfrm>
-              <a:off x="676623" y="3398464"/>
+              <a:off x="689323" y="3404814"/>
               <a:ext cx="300082" cy="369332"/>
             </a:xfrm>
             <a:prstGeom prst="rect">
@@ -5795,7 +5675,7 @@
         </p:nvSpPr>
         <p:spPr>
           <a:xfrm>
-            <a:off x="2202496" y="3926759"/>
+            <a:off x="2180628" y="3976450"/>
             <a:ext cx="1710100" cy="1162573"/>
           </a:xfrm>
           <a:prstGeom prst="roundRect">
@@ -5865,9 +5745,9 @@
         <p:grpSpPr>
           <a:xfrm>
             <a:off x="5769525" y="1519626"/>
-            <a:ext cx="470335" cy="976990"/>
+            <a:ext cx="470335" cy="995450"/>
             <a:chOff x="-338382" y="5539024"/>
-            <a:chExt cx="470335" cy="976990"/>
+            <a:chExt cx="470335" cy="995450"/>
           </a:xfrm>
         </p:grpSpPr>
         <p:cxnSp>
@@ -5925,8 +5805,8 @@
           </p:nvCxnSpPr>
           <p:spPr>
             <a:xfrm flipH="1">
-              <a:off x="-208077" y="5905598"/>
-              <a:ext cx="185002" cy="610416"/>
+              <a:off x="-238828" y="5905598"/>
+              <a:ext cx="215753" cy="628876"/>
             </a:xfrm>
             <a:prstGeom prst="line">
               <a:avLst/>
@@ -6053,550 +5933,6 @@
           </a:p>
         </p:txBody>
       </p:sp>
-      <p:sp>
-        <p:nvSpPr>
-          <p:cNvPr id="195" name="Rounded Rectangle 194">
-            <a:extLst>
-              <a:ext uri="{FF2B5EF4-FFF2-40B4-BE49-F238E27FC236}">
-                <a16:creationId xmlns:a16="http://schemas.microsoft.com/office/drawing/2014/main" id="{04C766F5-1904-17ED-8A3A-523EB678ACBA}"/>
-              </a:ext>
-            </a:extLst>
-          </p:cNvPr>
-          <p:cNvSpPr/>
-          <p:nvPr/>
-        </p:nvSpPr>
-        <p:spPr>
-          <a:xfrm>
-            <a:off x="217909" y="1481429"/>
-            <a:ext cx="1710100" cy="1162573"/>
-          </a:xfrm>
-          <a:prstGeom prst="roundRect">
-            <a:avLst/>
-          </a:prstGeom>
-          <a:solidFill>
-            <a:srgbClr val="FFFFFF"/>
-          </a:solidFill>
-          <a:ln>
-            <a:noFill/>
-          </a:ln>
-          <a:effectLst>
-            <a:glow rad="63500">
-              <a:schemeClr val="bg1">
-                <a:lumMod val="85000"/>
-              </a:schemeClr>
-            </a:glow>
-            <a:outerShdw blurRad="50800" dist="50800" dir="3480000" algn="ctr" rotWithShape="0">
-              <a:srgbClr val="000000">
-                <a:alpha val="66458"/>
-              </a:srgbClr>
-            </a:outerShdw>
-          </a:effectLst>
-        </p:spPr>
-        <p:style>
-          <a:lnRef idx="2">
-            <a:schemeClr val="accent1">
-              <a:shade val="50000"/>
-            </a:schemeClr>
-          </a:lnRef>
-          <a:fillRef idx="1">
-            <a:schemeClr val="accent1"/>
-          </a:fillRef>
-          <a:effectRef idx="0">
-            <a:schemeClr val="accent1"/>
-          </a:effectRef>
-          <a:fontRef idx="minor">
-            <a:schemeClr val="lt1"/>
-          </a:fontRef>
-        </p:style>
-        <p:txBody>
-          <a:bodyPr rot="0" spcFirstLastPara="0" vertOverflow="overflow" horzOverflow="overflow" vert="horz" wrap="square" lIns="42863" tIns="21431" rIns="42863" bIns="21431" numCol="1" spcCol="0" rtlCol="0" fromWordArt="0" anchor="ctr" anchorCtr="0" forceAA="0" compatLnSpc="1">
-            <a:prstTxWarp prst="textNoShape">
-              <a:avLst/>
-            </a:prstTxWarp>
-            <a:noAutofit/>
-          </a:bodyPr>
-          <a:lstStyle/>
-          <a:p>
-            <a:pPr algn="ctr"/>
-            <a:endParaRPr lang="en-US" sz="406" dirty="0"/>
-          </a:p>
-        </p:txBody>
-      </p:sp>
-      <p:pic>
-        <p:nvPicPr>
-          <p:cNvPr id="210" name="Picture 209">
-            <a:extLst>
-              <a:ext uri="{FF2B5EF4-FFF2-40B4-BE49-F238E27FC236}">
-                <a16:creationId xmlns:a16="http://schemas.microsoft.com/office/drawing/2014/main" id="{9060DE45-33FD-D70A-E12E-F1E1B2FB77E2}"/>
-              </a:ext>
-            </a:extLst>
-          </p:cNvPr>
-          <p:cNvPicPr>
-            <a:picLocks/>
-          </p:cNvPicPr>
-          <p:nvPr/>
-        </p:nvPicPr>
-        <p:blipFill rotWithShape="1">
-          <a:blip r:embed="rId11"/>
-          <a:srcRect l="-21342" t="74454" r="21342" b="-3777"/>
-          <a:stretch/>
-        </p:blipFill>
-        <p:spPr>
-          <a:xfrm>
-            <a:off x="-89292" y="2352192"/>
-            <a:ext cx="1805921" cy="374273"/>
-          </a:xfrm>
-          <a:prstGeom prst="rect">
-            <a:avLst/>
-          </a:prstGeom>
-        </p:spPr>
-      </p:pic>
-      <p:sp>
-        <p:nvSpPr>
-          <p:cNvPr id="198" name="Rounded Rectangle 197">
-            <a:extLst>
-              <a:ext uri="{FF2B5EF4-FFF2-40B4-BE49-F238E27FC236}">
-                <a16:creationId xmlns:a16="http://schemas.microsoft.com/office/drawing/2014/main" id="{B9333D77-777F-2BDD-5D33-C78E986C27B0}"/>
-              </a:ext>
-            </a:extLst>
-          </p:cNvPr>
-          <p:cNvSpPr/>
-          <p:nvPr/>
-        </p:nvSpPr>
-        <p:spPr>
-          <a:xfrm>
-            <a:off x="4136552" y="1498523"/>
-            <a:ext cx="1710100" cy="1161288"/>
-          </a:xfrm>
-          <a:prstGeom prst="roundRect">
-            <a:avLst/>
-          </a:prstGeom>
-          <a:solidFill>
-            <a:srgbClr val="FFFFFF"/>
-          </a:solidFill>
-          <a:ln>
-            <a:noFill/>
-          </a:ln>
-          <a:effectLst>
-            <a:glow rad="63500">
-              <a:schemeClr val="bg1">
-                <a:lumMod val="85000"/>
-              </a:schemeClr>
-            </a:glow>
-            <a:outerShdw blurRad="50800" dist="50800" dir="3480000" algn="ctr" rotWithShape="0">
-              <a:srgbClr val="000000">
-                <a:alpha val="66458"/>
-              </a:srgbClr>
-            </a:outerShdw>
-          </a:effectLst>
-        </p:spPr>
-        <p:style>
-          <a:lnRef idx="2">
-            <a:schemeClr val="accent1">
-              <a:shade val="50000"/>
-            </a:schemeClr>
-          </a:lnRef>
-          <a:fillRef idx="1">
-            <a:schemeClr val="accent1"/>
-          </a:fillRef>
-          <a:effectRef idx="0">
-            <a:schemeClr val="accent1"/>
-          </a:effectRef>
-          <a:fontRef idx="minor">
-            <a:schemeClr val="lt1"/>
-          </a:fontRef>
-        </p:style>
-        <p:txBody>
-          <a:bodyPr rot="0" spcFirstLastPara="0" vertOverflow="overflow" horzOverflow="overflow" vert="horz" wrap="square" lIns="42863" tIns="21431" rIns="42863" bIns="21431" numCol="1" spcCol="0" rtlCol="0" fromWordArt="0" anchor="ctr" anchorCtr="0" forceAA="0" compatLnSpc="1">
-            <a:prstTxWarp prst="textNoShape">
-              <a:avLst/>
-            </a:prstTxWarp>
-            <a:noAutofit/>
-          </a:bodyPr>
-          <a:lstStyle/>
-          <a:p>
-            <a:pPr algn="ctr"/>
-            <a:endParaRPr lang="en-US" sz="406" dirty="0"/>
-          </a:p>
-        </p:txBody>
-      </p:sp>
-      <p:pic>
-        <p:nvPicPr>
-          <p:cNvPr id="212" name="Picture 211">
-            <a:extLst>
-              <a:ext uri="{FF2B5EF4-FFF2-40B4-BE49-F238E27FC236}">
-                <a16:creationId xmlns:a16="http://schemas.microsoft.com/office/drawing/2014/main" id="{BB41CFFB-D89E-0357-BC12-0934F9103C6B}"/>
-              </a:ext>
-            </a:extLst>
-          </p:cNvPr>
-          <p:cNvPicPr>
-            <a:picLocks noChangeAspect="1"/>
-          </p:cNvPicPr>
-          <p:nvPr/>
-        </p:nvPicPr>
-        <p:blipFill rotWithShape="1">
-          <a:blip r:embed="rId11"/>
-          <a:srcRect l="-21342" t="74454" r="21342" b="-3777"/>
-          <a:stretch/>
-        </p:blipFill>
-        <p:spPr>
-          <a:xfrm>
-            <a:off x="3779413" y="2343156"/>
-            <a:ext cx="1767714" cy="369332"/>
-          </a:xfrm>
-          <a:prstGeom prst="rect">
-            <a:avLst/>
-          </a:prstGeom>
-        </p:spPr>
-      </p:pic>
-      <p:sp>
-        <p:nvSpPr>
-          <p:cNvPr id="202" name="Rounded Rectangle 201">
-            <a:extLst>
-              <a:ext uri="{FF2B5EF4-FFF2-40B4-BE49-F238E27FC236}">
-                <a16:creationId xmlns:a16="http://schemas.microsoft.com/office/drawing/2014/main" id="{3754E2C5-C065-3331-D673-A3D4CCF24962}"/>
-              </a:ext>
-            </a:extLst>
-          </p:cNvPr>
-          <p:cNvSpPr/>
-          <p:nvPr/>
-        </p:nvSpPr>
-        <p:spPr>
-          <a:xfrm>
-            <a:off x="2180742" y="2923342"/>
-            <a:ext cx="1710100" cy="1162573"/>
-          </a:xfrm>
-          <a:prstGeom prst="roundRect">
-            <a:avLst/>
-          </a:prstGeom>
-          <a:solidFill>
-            <a:srgbClr val="FFFFFF"/>
-          </a:solidFill>
-          <a:ln>
-            <a:noFill/>
-          </a:ln>
-          <a:effectLst>
-            <a:glow rad="63500">
-              <a:schemeClr val="bg1">
-                <a:lumMod val="85000"/>
-              </a:schemeClr>
-            </a:glow>
-            <a:outerShdw blurRad="50800" dist="50800" dir="3480000" algn="ctr" rotWithShape="0">
-              <a:srgbClr val="000000">
-                <a:alpha val="66458"/>
-              </a:srgbClr>
-            </a:outerShdw>
-          </a:effectLst>
-        </p:spPr>
-        <p:style>
-          <a:lnRef idx="2">
-            <a:schemeClr val="accent1">
-              <a:shade val="50000"/>
-            </a:schemeClr>
-          </a:lnRef>
-          <a:fillRef idx="1">
-            <a:schemeClr val="accent1"/>
-          </a:fillRef>
-          <a:effectRef idx="0">
-            <a:schemeClr val="accent1"/>
-          </a:effectRef>
-          <a:fontRef idx="minor">
-            <a:schemeClr val="lt1"/>
-          </a:fontRef>
-        </p:style>
-        <p:txBody>
-          <a:bodyPr rot="0" spcFirstLastPara="0" vertOverflow="overflow" horzOverflow="overflow" vert="horz" wrap="square" lIns="42863" tIns="21431" rIns="42863" bIns="21431" numCol="1" spcCol="0" rtlCol="0" fromWordArt="0" anchor="ctr" anchorCtr="0" forceAA="0" compatLnSpc="1">
-            <a:prstTxWarp prst="textNoShape">
-              <a:avLst/>
-            </a:prstTxWarp>
-            <a:noAutofit/>
-          </a:bodyPr>
-          <a:lstStyle/>
-          <a:p>
-            <a:pPr algn="ctr"/>
-            <a:endParaRPr lang="en-US" sz="406" dirty="0"/>
-          </a:p>
-        </p:txBody>
-      </p:sp>
-      <p:sp>
-        <p:nvSpPr>
-          <p:cNvPr id="224" name="TextBox 223">
-            <a:extLst>
-              <a:ext uri="{FF2B5EF4-FFF2-40B4-BE49-F238E27FC236}">
-                <a16:creationId xmlns:a16="http://schemas.microsoft.com/office/drawing/2014/main" id="{688D2BAB-6744-933D-B4D8-A20412858F86}"/>
-              </a:ext>
-            </a:extLst>
-          </p:cNvPr>
-          <p:cNvSpPr txBox="1"/>
-          <p:nvPr/>
-        </p:nvSpPr>
-        <p:spPr>
-          <a:xfrm>
-            <a:off x="2112243" y="3000146"/>
-            <a:ext cx="705642" cy="200055"/>
-          </a:xfrm>
-          <a:prstGeom prst="rect">
-            <a:avLst/>
-          </a:prstGeom>
-          <a:noFill/>
-        </p:spPr>
-        <p:txBody>
-          <a:bodyPr wrap="none" rtlCol="0">
-            <a:spAutoFit/>
-          </a:bodyPr>
-          <a:lstStyle/>
-          <a:p>
-            <a:r>
-              <a:rPr lang="en-US" sz="700" b="1" dirty="0"/>
-              <a:t>chronogram 1</a:t>
-            </a:r>
-          </a:p>
-        </p:txBody>
-      </p:sp>
-      <p:sp>
-        <p:nvSpPr>
-          <p:cNvPr id="225" name="TextBox 224">
-            <a:extLst>
-              <a:ext uri="{FF2B5EF4-FFF2-40B4-BE49-F238E27FC236}">
-                <a16:creationId xmlns:a16="http://schemas.microsoft.com/office/drawing/2014/main" id="{0827614C-0F26-F277-F12E-A26D69F42679}"/>
-              </a:ext>
-            </a:extLst>
-          </p:cNvPr>
-          <p:cNvSpPr txBox="1"/>
-          <p:nvPr/>
-        </p:nvSpPr>
-        <p:spPr>
-          <a:xfrm>
-            <a:off x="2154286" y="4133107"/>
-            <a:ext cx="705642" cy="200055"/>
-          </a:xfrm>
-          <a:prstGeom prst="rect">
-            <a:avLst/>
-          </a:prstGeom>
-          <a:noFill/>
-        </p:spPr>
-        <p:txBody>
-          <a:bodyPr wrap="none" rtlCol="0">
-            <a:spAutoFit/>
-          </a:bodyPr>
-          <a:lstStyle/>
-          <a:p>
-            <a:r>
-              <a:rPr lang="en-US" sz="700" b="1" dirty="0"/>
-              <a:t>chronogram 2</a:t>
-            </a:r>
-          </a:p>
-        </p:txBody>
-      </p:sp>
-      <p:sp>
-        <p:nvSpPr>
-          <p:cNvPr id="203" name="Rounded Rectangle 202">
-            <a:extLst>
-              <a:ext uri="{FF2B5EF4-FFF2-40B4-BE49-F238E27FC236}">
-                <a16:creationId xmlns:a16="http://schemas.microsoft.com/office/drawing/2014/main" id="{71114076-1724-4F71-6540-F82FF4DFD241}"/>
-              </a:ext>
-            </a:extLst>
-          </p:cNvPr>
-          <p:cNvSpPr/>
-          <p:nvPr/>
-        </p:nvSpPr>
-        <p:spPr>
-          <a:xfrm>
-            <a:off x="4174312" y="2930949"/>
-            <a:ext cx="1710100" cy="1162573"/>
-          </a:xfrm>
-          <a:prstGeom prst="roundRect">
-            <a:avLst/>
-          </a:prstGeom>
-          <a:solidFill>
-            <a:srgbClr val="FFFFFF"/>
-          </a:solidFill>
-          <a:ln>
-            <a:noFill/>
-          </a:ln>
-          <a:effectLst>
-            <a:glow rad="63500">
-              <a:schemeClr val="bg1">
-                <a:lumMod val="85000"/>
-              </a:schemeClr>
-            </a:glow>
-            <a:outerShdw blurRad="50800" dist="50800" dir="3480000" algn="ctr" rotWithShape="0">
-              <a:srgbClr val="000000">
-                <a:alpha val="66458"/>
-              </a:srgbClr>
-            </a:outerShdw>
-          </a:effectLst>
-        </p:spPr>
-        <p:style>
-          <a:lnRef idx="2">
-            <a:schemeClr val="accent1">
-              <a:shade val="50000"/>
-            </a:schemeClr>
-          </a:lnRef>
-          <a:fillRef idx="1">
-            <a:schemeClr val="accent1"/>
-          </a:fillRef>
-          <a:effectRef idx="0">
-            <a:schemeClr val="accent1"/>
-          </a:effectRef>
-          <a:fontRef idx="minor">
-            <a:schemeClr val="lt1"/>
-          </a:fontRef>
-        </p:style>
-        <p:txBody>
-          <a:bodyPr rot="0" spcFirstLastPara="0" vertOverflow="overflow" horzOverflow="overflow" vert="horz" wrap="square" lIns="42863" tIns="21431" rIns="42863" bIns="21431" numCol="1" spcCol="0" rtlCol="0" fromWordArt="0" anchor="ctr" anchorCtr="0" forceAA="0" compatLnSpc="1">
-            <a:prstTxWarp prst="textNoShape">
-              <a:avLst/>
-            </a:prstTxWarp>
-            <a:noAutofit/>
-          </a:bodyPr>
-          <a:lstStyle/>
-          <a:p>
-            <a:pPr algn="ctr"/>
-            <a:endParaRPr lang="en-US" sz="406" dirty="0"/>
-          </a:p>
-        </p:txBody>
-      </p:sp>
-      <p:sp>
-        <p:nvSpPr>
-          <p:cNvPr id="226" name="TextBox 225">
-            <a:extLst>
-              <a:ext uri="{FF2B5EF4-FFF2-40B4-BE49-F238E27FC236}">
-                <a16:creationId xmlns:a16="http://schemas.microsoft.com/office/drawing/2014/main" id="{4FDBD919-AD97-B25F-3647-1D59938A2F85}"/>
-              </a:ext>
-            </a:extLst>
-          </p:cNvPr>
-          <p:cNvSpPr txBox="1"/>
-          <p:nvPr/>
-        </p:nvSpPr>
-        <p:spPr>
-          <a:xfrm>
-            <a:off x="4116534" y="3037803"/>
-            <a:ext cx="705642" cy="200055"/>
-          </a:xfrm>
-          <a:prstGeom prst="rect">
-            <a:avLst/>
-          </a:prstGeom>
-          <a:noFill/>
-        </p:spPr>
-        <p:txBody>
-          <a:bodyPr wrap="none" rtlCol="0">
-            <a:spAutoFit/>
-          </a:bodyPr>
-          <a:lstStyle/>
-          <a:p>
-            <a:r>
-              <a:rPr lang="en-US" sz="700" b="1" dirty="0"/>
-              <a:t>chronogram 1</a:t>
-            </a:r>
-          </a:p>
-        </p:txBody>
-      </p:sp>
-      <p:sp>
-        <p:nvSpPr>
-          <p:cNvPr id="227" name="TextBox 226">
-            <a:extLst>
-              <a:ext uri="{FF2B5EF4-FFF2-40B4-BE49-F238E27FC236}">
-                <a16:creationId xmlns:a16="http://schemas.microsoft.com/office/drawing/2014/main" id="{F340506E-8F49-8B5B-09EA-A89ABBF2A2E1}"/>
-              </a:ext>
-            </a:extLst>
-          </p:cNvPr>
-          <p:cNvSpPr txBox="1"/>
-          <p:nvPr/>
-        </p:nvSpPr>
-        <p:spPr>
-          <a:xfrm>
-            <a:off x="4128062" y="4203897"/>
-            <a:ext cx="705642" cy="200055"/>
-          </a:xfrm>
-          <a:prstGeom prst="rect">
-            <a:avLst/>
-          </a:prstGeom>
-          <a:noFill/>
-        </p:spPr>
-        <p:txBody>
-          <a:bodyPr wrap="none" rtlCol="0">
-            <a:spAutoFit/>
-          </a:bodyPr>
-          <a:lstStyle/>
-          <a:p>
-            <a:r>
-              <a:rPr lang="en-US" sz="700" b="1" dirty="0"/>
-              <a:t>chronogram 2</a:t>
-            </a:r>
-          </a:p>
-        </p:txBody>
-      </p:sp>
-      <p:sp>
-        <p:nvSpPr>
-          <p:cNvPr id="228" name="TextBox 227">
-            <a:extLst>
-              <a:ext uri="{FF2B5EF4-FFF2-40B4-BE49-F238E27FC236}">
-                <a16:creationId xmlns:a16="http://schemas.microsoft.com/office/drawing/2014/main" id="{1B9A69D6-799C-FB1A-D0BA-029E81151F8D}"/>
-              </a:ext>
-            </a:extLst>
-          </p:cNvPr>
-          <p:cNvSpPr txBox="1"/>
-          <p:nvPr/>
-        </p:nvSpPr>
-        <p:spPr>
-          <a:xfrm>
-            <a:off x="175542" y="2990353"/>
-            <a:ext cx="705642" cy="200055"/>
-          </a:xfrm>
-          <a:prstGeom prst="rect">
-            <a:avLst/>
-          </a:prstGeom>
-          <a:noFill/>
-        </p:spPr>
-        <p:txBody>
-          <a:bodyPr wrap="none" rtlCol="0">
-            <a:spAutoFit/>
-          </a:bodyPr>
-          <a:lstStyle/>
-          <a:p>
-            <a:r>
-              <a:rPr lang="en-US" sz="700" b="1" dirty="0"/>
-              <a:t>chronogram 1</a:t>
-            </a:r>
-          </a:p>
-        </p:txBody>
-      </p:sp>
-      <p:sp>
-        <p:nvSpPr>
-          <p:cNvPr id="229" name="TextBox 228">
-            <a:extLst>
-              <a:ext uri="{FF2B5EF4-FFF2-40B4-BE49-F238E27FC236}">
-                <a16:creationId xmlns:a16="http://schemas.microsoft.com/office/drawing/2014/main" id="{7280181E-42D9-9D81-8EAC-1E04B9CC69E5}"/>
-              </a:ext>
-            </a:extLst>
-          </p:cNvPr>
-          <p:cNvSpPr txBox="1"/>
-          <p:nvPr/>
-        </p:nvSpPr>
-        <p:spPr>
-          <a:xfrm>
-            <a:off x="182996" y="4105505"/>
-            <a:ext cx="705642" cy="200055"/>
-          </a:xfrm>
-          <a:prstGeom prst="rect">
-            <a:avLst/>
-          </a:prstGeom>
-          <a:noFill/>
-        </p:spPr>
-        <p:txBody>
-          <a:bodyPr wrap="none" rtlCol="0">
-            <a:spAutoFit/>
-          </a:bodyPr>
-          <a:lstStyle/>
-          <a:p>
-            <a:r>
-              <a:rPr lang="en-US" sz="700" b="1" dirty="0"/>
-              <a:t>chronogram 2</a:t>
-            </a:r>
-          </a:p>
-        </p:txBody>
-      </p:sp>
       <p:grpSp>
         <p:nvGrpSpPr>
           <p:cNvPr id="253" name="Group 252">
@@ -6611,10 +5947,10 @@
         </p:nvGrpSpPr>
         <p:grpSpPr>
           <a:xfrm>
-            <a:off x="3399173" y="1644716"/>
-            <a:ext cx="834819" cy="1408477"/>
-            <a:chOff x="-631833" y="5430753"/>
-            <a:chExt cx="834819" cy="1408477"/>
+            <a:off x="3351692" y="1644716"/>
+            <a:ext cx="882300" cy="1383077"/>
+            <a:chOff x="-679314" y="5430753"/>
+            <a:chExt cx="882300" cy="1383077"/>
           </a:xfrm>
         </p:grpSpPr>
         <p:cxnSp>
@@ -6672,8 +6008,8 @@
           </p:nvCxnSpPr>
           <p:spPr>
             <a:xfrm flipH="1" flipV="1">
-              <a:off x="-631833" y="6506127"/>
-              <a:ext cx="668557" cy="95791"/>
+              <a:off x="-679314" y="6482713"/>
+              <a:ext cx="716038" cy="119205"/>
             </a:xfrm>
             <a:prstGeom prst="line">
               <a:avLst/>
@@ -6709,7 +6045,7 @@
           </p:nvSpPr>
           <p:spPr>
             <a:xfrm>
-              <a:off x="-97096" y="6469898"/>
+              <a:off x="-97096" y="6444498"/>
               <a:ext cx="300082" cy="369332"/>
             </a:xfrm>
             <a:prstGeom prst="rect">
@@ -6745,10 +6081,10 @@
         </p:nvGrpSpPr>
         <p:grpSpPr>
           <a:xfrm>
-            <a:off x="5763" y="2027763"/>
-            <a:ext cx="456094" cy="880153"/>
-            <a:chOff x="1131587" y="4642312"/>
-            <a:chExt cx="456094" cy="880153"/>
+            <a:off x="12113" y="2026097"/>
+            <a:ext cx="449744" cy="875469"/>
+            <a:chOff x="1137937" y="4640646"/>
+            <a:chExt cx="449744" cy="875469"/>
           </a:xfrm>
         </p:grpSpPr>
         <p:cxnSp>
@@ -6767,8 +6103,8 @@
           </p:nvCxnSpPr>
           <p:spPr>
             <a:xfrm flipH="1">
-              <a:off x="1271042" y="4642312"/>
-              <a:ext cx="44236" cy="725345"/>
+              <a:off x="1271042" y="4640646"/>
+              <a:ext cx="66464" cy="727011"/>
             </a:xfrm>
             <a:prstGeom prst="line">
               <a:avLst/>
@@ -6843,7 +6179,7 @@
           </p:nvSpPr>
           <p:spPr>
             <a:xfrm rot="16200000">
-              <a:off x="1166212" y="5187758"/>
+              <a:off x="1172562" y="5181408"/>
               <a:ext cx="300082" cy="369332"/>
             </a:xfrm>
             <a:prstGeom prst="rect">
@@ -6867,48 +6203,379 @@
       </p:grpSp>
       <p:sp>
         <p:nvSpPr>
-          <p:cNvPr id="289" name="TextBox 288">
+          <p:cNvPr id="195" name="Rounded Rectangle 194">
             <a:extLst>
               <a:ext uri="{FF2B5EF4-FFF2-40B4-BE49-F238E27FC236}">
-                <a16:creationId xmlns:a16="http://schemas.microsoft.com/office/drawing/2014/main" id="{237B27F2-C016-2137-A25A-961DCC654C95}"/>
+                <a16:creationId xmlns:a16="http://schemas.microsoft.com/office/drawing/2014/main" id="{04C766F5-1904-17ED-8A3A-523EB678ACBA}"/>
               </a:ext>
             </a:extLst>
           </p:cNvPr>
-          <p:cNvSpPr txBox="1"/>
+          <p:cNvSpPr/>
           <p:nvPr/>
         </p:nvSpPr>
         <p:spPr>
           <a:xfrm>
-            <a:off x="2166563" y="1445238"/>
-            <a:ext cx="1699895" cy="246221"/>
+            <a:off x="217909" y="1481429"/>
+            <a:ext cx="1710100" cy="1162573"/>
           </a:xfrm>
-          <a:prstGeom prst="rect">
+          <a:prstGeom prst="roundRect">
+            <a:avLst/>
+          </a:prstGeom>
+          <a:solidFill>
+            <a:srgbClr val="FFFFFF"/>
+          </a:solidFill>
+          <a:ln>
+            <a:noFill/>
+          </a:ln>
+          <a:effectLst>
+            <a:glow rad="63500">
+              <a:schemeClr val="bg1">
+                <a:lumMod val="85000"/>
+              </a:schemeClr>
+            </a:glow>
+            <a:outerShdw blurRad="50800" dist="50800" dir="3480000" algn="ctr" rotWithShape="0">
+              <a:srgbClr val="000000">
+                <a:alpha val="66458"/>
+              </a:srgbClr>
+            </a:outerShdw>
+          </a:effectLst>
+        </p:spPr>
+        <p:style>
+          <a:lnRef idx="2">
+            <a:schemeClr val="accent1">
+              <a:shade val="50000"/>
+            </a:schemeClr>
+          </a:lnRef>
+          <a:fillRef idx="1">
+            <a:schemeClr val="accent1"/>
+          </a:fillRef>
+          <a:effectRef idx="0">
+            <a:schemeClr val="accent1"/>
+          </a:effectRef>
+          <a:fontRef idx="minor">
+            <a:schemeClr val="lt1"/>
+          </a:fontRef>
+        </p:style>
+        <p:txBody>
+          <a:bodyPr rot="0" spcFirstLastPara="0" vertOverflow="overflow" horzOverflow="overflow" vert="horz" wrap="square" lIns="42863" tIns="21431" rIns="42863" bIns="21431" numCol="1" spcCol="0" rtlCol="0" fromWordArt="0" anchor="ctr" anchorCtr="0" forceAA="0" compatLnSpc="1">
+            <a:prstTxWarp prst="textNoShape">
+              <a:avLst/>
+            </a:prstTxWarp>
+            <a:noAutofit/>
+          </a:bodyPr>
+          <a:lstStyle/>
+          <a:p>
+            <a:pPr algn="ctr"/>
+            <a:endParaRPr lang="en-US" sz="406" dirty="0"/>
+          </a:p>
+        </p:txBody>
+      </p:sp>
+      <p:sp>
+        <p:nvSpPr>
+          <p:cNvPr id="198" name="Rounded Rectangle 197">
+            <a:extLst>
+              <a:ext uri="{FF2B5EF4-FFF2-40B4-BE49-F238E27FC236}">
+                <a16:creationId xmlns:a16="http://schemas.microsoft.com/office/drawing/2014/main" id="{B9333D77-777F-2BDD-5D33-C78E986C27B0}"/>
+              </a:ext>
+            </a:extLst>
+          </p:cNvPr>
+          <p:cNvSpPr/>
+          <p:nvPr/>
+        </p:nvSpPr>
+        <p:spPr>
+          <a:xfrm>
+            <a:off x="4136552" y="1486800"/>
+            <a:ext cx="1710100" cy="1161288"/>
+          </a:xfrm>
+          <a:prstGeom prst="roundRect">
+            <a:avLst/>
+          </a:prstGeom>
+          <a:solidFill>
+            <a:srgbClr val="FFFFFF"/>
+          </a:solidFill>
+          <a:ln>
+            <a:noFill/>
+          </a:ln>
+          <a:effectLst>
+            <a:glow rad="63500">
+              <a:schemeClr val="bg1">
+                <a:lumMod val="85000"/>
+              </a:schemeClr>
+            </a:glow>
+            <a:outerShdw blurRad="50800" dist="50800" dir="3480000" algn="ctr" rotWithShape="0">
+              <a:srgbClr val="000000">
+                <a:alpha val="66458"/>
+              </a:srgbClr>
+            </a:outerShdw>
+          </a:effectLst>
+        </p:spPr>
+        <p:style>
+          <a:lnRef idx="2">
+            <a:schemeClr val="accent1">
+              <a:shade val="50000"/>
+            </a:schemeClr>
+          </a:lnRef>
+          <a:fillRef idx="1">
+            <a:schemeClr val="accent1"/>
+          </a:fillRef>
+          <a:effectRef idx="0">
+            <a:schemeClr val="accent1"/>
+          </a:effectRef>
+          <a:fontRef idx="minor">
+            <a:schemeClr val="lt1"/>
+          </a:fontRef>
+        </p:style>
+        <p:txBody>
+          <a:bodyPr rot="0" spcFirstLastPara="0" vertOverflow="overflow" horzOverflow="overflow" vert="horz" wrap="square" lIns="42863" tIns="21431" rIns="42863" bIns="21431" numCol="1" spcCol="0" rtlCol="0" fromWordArt="0" anchor="ctr" anchorCtr="0" forceAA="0" compatLnSpc="1">
+            <a:prstTxWarp prst="textNoShape">
+              <a:avLst/>
+            </a:prstTxWarp>
+            <a:noAutofit/>
+          </a:bodyPr>
+          <a:lstStyle/>
+          <a:p>
+            <a:pPr algn="ctr"/>
+            <a:endParaRPr lang="en-US" sz="406" dirty="0"/>
+          </a:p>
+        </p:txBody>
+      </p:sp>
+      <p:sp>
+        <p:nvSpPr>
+          <p:cNvPr id="202" name="Rounded Rectangle 201">
+            <a:extLst>
+              <a:ext uri="{FF2B5EF4-FFF2-40B4-BE49-F238E27FC236}">
+                <a16:creationId xmlns:a16="http://schemas.microsoft.com/office/drawing/2014/main" id="{3754E2C5-C065-3331-D673-A3D4CCF24962}"/>
+              </a:ext>
+            </a:extLst>
+          </p:cNvPr>
+          <p:cNvSpPr/>
+          <p:nvPr/>
+        </p:nvSpPr>
+        <p:spPr>
+          <a:xfrm>
+            <a:off x="2180628" y="2899896"/>
+            <a:ext cx="1710100" cy="1162573"/>
+          </a:xfrm>
+          <a:prstGeom prst="roundRect">
+            <a:avLst/>
+          </a:prstGeom>
+          <a:solidFill>
+            <a:srgbClr val="FFFFFF"/>
+          </a:solidFill>
+          <a:ln>
+            <a:noFill/>
+          </a:ln>
+          <a:effectLst>
+            <a:glow rad="63500">
+              <a:schemeClr val="bg1">
+                <a:lumMod val="85000"/>
+              </a:schemeClr>
+            </a:glow>
+            <a:outerShdw blurRad="50800" dist="50800" dir="3480000" algn="ctr" rotWithShape="0">
+              <a:srgbClr val="000000">
+                <a:alpha val="66458"/>
+              </a:srgbClr>
+            </a:outerShdw>
+          </a:effectLst>
+        </p:spPr>
+        <p:style>
+          <a:lnRef idx="2">
+            <a:schemeClr val="accent1">
+              <a:shade val="50000"/>
+            </a:schemeClr>
+          </a:lnRef>
+          <a:fillRef idx="1">
+            <a:schemeClr val="accent1"/>
+          </a:fillRef>
+          <a:effectRef idx="0">
+            <a:schemeClr val="accent1"/>
+          </a:effectRef>
+          <a:fontRef idx="minor">
+            <a:schemeClr val="lt1"/>
+          </a:fontRef>
+        </p:style>
+        <p:txBody>
+          <a:bodyPr rot="0" spcFirstLastPara="0" vertOverflow="overflow" horzOverflow="overflow" vert="horz" wrap="square" lIns="42863" tIns="21431" rIns="42863" bIns="21431" numCol="1" spcCol="0" rtlCol="0" fromWordArt="0" anchor="ctr" anchorCtr="0" forceAA="0" compatLnSpc="1">
+            <a:prstTxWarp prst="textNoShape">
+              <a:avLst/>
+            </a:prstTxWarp>
+            <a:noAutofit/>
+          </a:bodyPr>
+          <a:lstStyle/>
+          <a:p>
+            <a:pPr algn="ctr"/>
+            <a:endParaRPr lang="en-US" sz="406" dirty="0"/>
+          </a:p>
+        </p:txBody>
+      </p:sp>
+      <p:sp>
+        <p:nvSpPr>
+          <p:cNvPr id="203" name="Rounded Rectangle 202">
+            <a:extLst>
+              <a:ext uri="{FF2B5EF4-FFF2-40B4-BE49-F238E27FC236}">
+                <a16:creationId xmlns:a16="http://schemas.microsoft.com/office/drawing/2014/main" id="{71114076-1724-4F71-6540-F82FF4DFD241}"/>
+              </a:ext>
+            </a:extLst>
+          </p:cNvPr>
+          <p:cNvSpPr/>
+          <p:nvPr/>
+        </p:nvSpPr>
+        <p:spPr>
+          <a:xfrm>
+            <a:off x="4172180" y="2907503"/>
+            <a:ext cx="1710100" cy="1162573"/>
+          </a:xfrm>
+          <a:prstGeom prst="roundRect">
+            <a:avLst/>
+          </a:prstGeom>
+          <a:solidFill>
+            <a:srgbClr val="FFFFFF"/>
+          </a:solidFill>
+          <a:ln>
+            <a:noFill/>
+          </a:ln>
+          <a:effectLst>
+            <a:glow rad="63500">
+              <a:schemeClr val="bg1">
+                <a:lumMod val="85000"/>
+              </a:schemeClr>
+            </a:glow>
+            <a:outerShdw blurRad="50800" dist="50800" dir="3480000" algn="ctr" rotWithShape="0">
+              <a:srgbClr val="000000">
+                <a:alpha val="66458"/>
+              </a:srgbClr>
+            </a:outerShdw>
+          </a:effectLst>
+        </p:spPr>
+        <p:style>
+          <a:lnRef idx="2">
+            <a:schemeClr val="accent1">
+              <a:shade val="50000"/>
+            </a:schemeClr>
+          </a:lnRef>
+          <a:fillRef idx="1">
+            <a:schemeClr val="accent1"/>
+          </a:fillRef>
+          <a:effectRef idx="0">
+            <a:schemeClr val="accent1"/>
+          </a:effectRef>
+          <a:fontRef idx="minor">
+            <a:schemeClr val="lt1"/>
+          </a:fontRef>
+        </p:style>
+        <p:txBody>
+          <a:bodyPr rot="0" spcFirstLastPara="0" vertOverflow="overflow" horzOverflow="overflow" vert="horz" wrap="square" lIns="42863" tIns="21431" rIns="42863" bIns="21431" numCol="1" spcCol="0" rtlCol="0" fromWordArt="0" anchor="ctr" anchorCtr="0" forceAA="0" compatLnSpc="1">
+            <a:prstTxWarp prst="textNoShape">
+              <a:avLst/>
+            </a:prstTxWarp>
+            <a:noAutofit/>
+          </a:bodyPr>
+          <a:lstStyle/>
+          <a:p>
+            <a:pPr algn="ctr"/>
+            <a:endParaRPr lang="en-US" sz="406" dirty="0"/>
+          </a:p>
+        </p:txBody>
+      </p:sp>
+      <p:sp>
+        <p:nvSpPr>
+          <p:cNvPr id="86" name="Rounded Rectangle 85">
+            <a:extLst>
+              <a:ext uri="{FF2B5EF4-FFF2-40B4-BE49-F238E27FC236}">
+                <a16:creationId xmlns:a16="http://schemas.microsoft.com/office/drawing/2014/main" id="{4DE9DCC5-B012-AA02-DCB2-438EF505EA39}"/>
+              </a:ext>
+            </a:extLst>
+          </p:cNvPr>
+          <p:cNvSpPr/>
+          <p:nvPr/>
+        </p:nvSpPr>
+        <p:spPr>
+          <a:xfrm>
+            <a:off x="214059" y="5614264"/>
+            <a:ext cx="4932372" cy="2090258"/>
+          </a:xfrm>
+          <a:prstGeom prst="roundRect">
             <a:avLst/>
           </a:prstGeom>
           <a:noFill/>
+          <a:ln w="19050">
+            <a:solidFill>
+              <a:schemeClr val="tx1"/>
+            </a:solidFill>
+          </a:ln>
         </p:spPr>
-        <p:txBody>
-          <a:bodyPr wrap="square" rtlCol="0">
-            <a:spAutoFit/>
-          </a:bodyPr>
+        <p:style>
+          <a:lnRef idx="2">
+            <a:schemeClr val="accent1">
+              <a:shade val="15000"/>
+            </a:schemeClr>
+          </a:lnRef>
+          <a:fillRef idx="1">
+            <a:schemeClr val="accent1"/>
+          </a:fillRef>
+          <a:effectRef idx="0">
+            <a:schemeClr val="accent1"/>
+          </a:effectRef>
+          <a:fontRef idx="minor">
+            <a:schemeClr val="lt1"/>
+          </a:fontRef>
+        </p:style>
+        <p:txBody>
+          <a:bodyPr rtlCol="0" anchor="ctr"/>
           <a:lstStyle/>
           <a:p>
             <a:pPr algn="ctr"/>
-            <a:r>
-              <a:rPr lang="en-US" sz="1000" dirty="0"/>
-              <a:t>Hooper </a:t>
-            </a:r>
-            <a:r>
-              <a:rPr lang="en-US" sz="1000" i="1" dirty="0"/>
-              <a:t>et al</a:t>
-            </a:r>
-            <a:r>
-              <a:rPr lang="en-US" sz="1000" dirty="0"/>
-              <a:t>. 2017</a:t>
-            </a:r>
-          </a:p>
-        </p:txBody>
-      </p:sp>
+            <a:endParaRPr lang="en-US"/>
+          </a:p>
+        </p:txBody>
+      </p:sp>
+      <p:cxnSp>
+        <p:nvCxnSpPr>
+          <p:cNvPr id="233" name="Straight Arrow Connector 232">
+            <a:extLst>
+              <a:ext uri="{FF2B5EF4-FFF2-40B4-BE49-F238E27FC236}">
+                <a16:creationId xmlns:a16="http://schemas.microsoft.com/office/drawing/2014/main" id="{9CD0644A-A289-D356-AF63-26E6F2AA8640}"/>
+              </a:ext>
+            </a:extLst>
+          </p:cNvPr>
+          <p:cNvCxnSpPr>
+            <a:cxnSpLocks/>
+            <a:stCxn id="162" idx="1"/>
+            <a:endCxn id="86" idx="3"/>
+          </p:cNvCxnSpPr>
+          <p:nvPr/>
+        </p:nvCxnSpPr>
+        <p:spPr>
+          <a:xfrm flipH="1">
+            <a:off x="5146431" y="6652022"/>
+            <a:ext cx="861803" cy="7371"/>
+          </a:xfrm>
+          <a:prstGeom prst="straightConnector1">
+            <a:avLst/>
+          </a:prstGeom>
+          <a:ln w="19050">
+            <a:solidFill>
+              <a:schemeClr val="tx1"/>
+            </a:solidFill>
+            <a:headEnd type="oval"/>
+            <a:tailEnd type="arrow"/>
+          </a:ln>
+        </p:spPr>
+        <p:style>
+          <a:lnRef idx="1">
+            <a:schemeClr val="accent1"/>
+          </a:lnRef>
+          <a:fillRef idx="0">
+            <a:schemeClr val="accent1"/>
+          </a:fillRef>
+          <a:effectRef idx="0">
+            <a:schemeClr val="accent1"/>
+          </a:effectRef>
+          <a:fontRef idx="minor">
+            <a:schemeClr val="tx1"/>
+          </a:fontRef>
+        </p:style>
+      </p:cxnSp>
       <p:sp>
         <p:nvSpPr>
           <p:cNvPr id="291" name="TextBox 290">
@@ -6923,7 +6590,7 @@
         </p:nvSpPr>
         <p:spPr>
           <a:xfrm>
-            <a:off x="4147323" y="1469290"/>
+            <a:off x="4147323" y="1427957"/>
             <a:ext cx="1698153" cy="246221"/>
           </a:xfrm>
           <a:prstGeom prst="rect">
@@ -6967,7 +6634,7 @@
         </p:nvSpPr>
         <p:spPr>
           <a:xfrm>
-            <a:off x="480676" y="2844160"/>
+            <a:off x="480676" y="2825151"/>
             <a:ext cx="1107996" cy="246221"/>
           </a:xfrm>
           <a:prstGeom prst="rect">
@@ -7010,7 +6677,7 @@
         </p:nvSpPr>
         <p:spPr>
           <a:xfrm>
-            <a:off x="2179998" y="2867332"/>
+            <a:off x="2179998" y="2831501"/>
             <a:ext cx="1710100" cy="246221"/>
           </a:xfrm>
           <a:prstGeom prst="rect">
@@ -7054,7 +6721,7 @@
         </p:nvSpPr>
         <p:spPr>
           <a:xfrm>
-            <a:off x="4172021" y="2876479"/>
+            <a:off x="4172021" y="2836874"/>
             <a:ext cx="1712391" cy="246221"/>
           </a:xfrm>
           <a:prstGeom prst="rect">
@@ -7088,35 +6755,6 @@
           </a:p>
         </p:txBody>
       </p:sp>
-      <p:pic>
-        <p:nvPicPr>
-          <p:cNvPr id="304" name="Picture 303">
-            <a:extLst>
-              <a:ext uri="{FF2B5EF4-FFF2-40B4-BE49-F238E27FC236}">
-                <a16:creationId xmlns:a16="http://schemas.microsoft.com/office/drawing/2014/main" id="{0DF41AD3-017A-9DE5-90AE-511F22682109}"/>
-              </a:ext>
-            </a:extLst>
-          </p:cNvPr>
-          <p:cNvPicPr>
-            <a:picLocks noChangeAspect="1"/>
-          </p:cNvPicPr>
-          <p:nvPr/>
-        </p:nvPicPr>
-        <p:blipFill rotWithShape="1">
-          <a:blip r:embed="rId12"/>
-          <a:srcRect b="30081"/>
-          <a:stretch/>
-        </p:blipFill>
-        <p:spPr>
-          <a:xfrm>
-            <a:off x="299093" y="1514698"/>
-            <a:ext cx="1801455" cy="923675"/>
-          </a:xfrm>
-          <a:prstGeom prst="rect">
-            <a:avLst/>
-          </a:prstGeom>
-        </p:spPr>
-      </p:pic>
       <p:sp>
         <p:nvSpPr>
           <p:cNvPr id="288" name="TextBox 287">
@@ -7131,7 +6769,7 @@
         </p:nvSpPr>
         <p:spPr>
           <a:xfrm>
-            <a:off x="214058" y="1456004"/>
+            <a:off x="214058" y="1427957"/>
             <a:ext cx="1710099" cy="246221"/>
           </a:xfrm>
           <a:prstGeom prst="rect">
@@ -7204,12 +6842,1508 @@
           </a:fontRef>
         </p:style>
       </p:cxnSp>
+      <p:grpSp>
+        <p:nvGrpSpPr>
+          <p:cNvPr id="469" name="Group 468">
+            <a:extLst>
+              <a:ext uri="{FF2B5EF4-FFF2-40B4-BE49-F238E27FC236}">
+                <a16:creationId xmlns:a16="http://schemas.microsoft.com/office/drawing/2014/main" id="{6FCC725E-C3EA-2444-D408-A27E2EBABD18}"/>
+              </a:ext>
+            </a:extLst>
+          </p:cNvPr>
+          <p:cNvGrpSpPr/>
+          <p:nvPr/>
+        </p:nvGrpSpPr>
+        <p:grpSpPr>
+          <a:xfrm>
+            <a:off x="2177264" y="1427957"/>
+            <a:ext cx="1701894" cy="1251245"/>
+            <a:chOff x="2164564" y="1427957"/>
+            <a:chExt cx="1701894" cy="1251245"/>
+          </a:xfrm>
+        </p:grpSpPr>
+        <p:sp>
+          <p:nvSpPr>
+            <p:cNvPr id="289" name="TextBox 288">
+              <a:extLst>
+                <a:ext uri="{FF2B5EF4-FFF2-40B4-BE49-F238E27FC236}">
+                  <a16:creationId xmlns:a16="http://schemas.microsoft.com/office/drawing/2014/main" id="{237B27F2-C016-2137-A25A-961DCC654C95}"/>
+                </a:ext>
+              </a:extLst>
+            </p:cNvPr>
+            <p:cNvSpPr txBox="1"/>
+            <p:nvPr/>
+          </p:nvSpPr>
+          <p:spPr>
+            <a:xfrm>
+              <a:off x="2166563" y="1427957"/>
+              <a:ext cx="1699895" cy="246221"/>
+            </a:xfrm>
+            <a:prstGeom prst="rect">
+              <a:avLst/>
+            </a:prstGeom>
+            <a:noFill/>
+          </p:spPr>
+          <p:txBody>
+            <a:bodyPr wrap="square" rtlCol="0">
+              <a:spAutoFit/>
+            </a:bodyPr>
+            <a:lstStyle/>
+            <a:p>
+              <a:pPr algn="ctr"/>
+              <a:r>
+                <a:rPr lang="en-US" sz="1000" dirty="0"/>
+                <a:t>Hooper </a:t>
+              </a:r>
+              <a:r>
+                <a:rPr lang="en-US" sz="1000" i="1" dirty="0"/>
+                <a:t>et al</a:t>
+              </a:r>
+              <a:r>
+                <a:rPr lang="en-US" sz="1000" dirty="0"/>
+                <a:t>. 2017</a:t>
+              </a:r>
+            </a:p>
+          </p:txBody>
+        </p:sp>
+        <p:pic>
+          <p:nvPicPr>
+            <p:cNvPr id="335" name="Picture 334">
+              <a:extLst>
+                <a:ext uri="{FF2B5EF4-FFF2-40B4-BE49-F238E27FC236}">
+                  <a16:creationId xmlns:a16="http://schemas.microsoft.com/office/drawing/2014/main" id="{A0D63741-9C39-5A2C-AFC8-DF7DC1AFCB1B}"/>
+                </a:ext>
+              </a:extLst>
+            </p:cNvPr>
+            <p:cNvPicPr>
+              <a:picLocks noChangeAspect="1"/>
+            </p:cNvPicPr>
+            <p:nvPr/>
+          </p:nvPicPr>
+          <p:blipFill rotWithShape="1">
+            <a:blip r:embed="rId11"/>
+            <a:srcRect b="20449"/>
+            <a:stretch/>
+          </p:blipFill>
+          <p:spPr>
+            <a:xfrm>
+              <a:off x="2167739" y="1535868"/>
+              <a:ext cx="1691640" cy="986858"/>
+            </a:xfrm>
+            <a:prstGeom prst="rect">
+              <a:avLst/>
+            </a:prstGeom>
+          </p:spPr>
+        </p:pic>
+        <p:pic>
+          <p:nvPicPr>
+            <p:cNvPr id="336" name="Picture 335">
+              <a:extLst>
+                <a:ext uri="{FF2B5EF4-FFF2-40B4-BE49-F238E27FC236}">
+                  <a16:creationId xmlns:a16="http://schemas.microsoft.com/office/drawing/2014/main" id="{02728E80-D97E-F702-E73F-3673C2AF66DC}"/>
+                </a:ext>
+              </a:extLst>
+            </p:cNvPr>
+            <p:cNvPicPr>
+              <a:picLocks noChangeAspect="1"/>
+            </p:cNvPicPr>
+            <p:nvPr/>
+          </p:nvPicPr>
+          <p:blipFill rotWithShape="1">
+            <a:blip r:embed="rId12"/>
+            <a:srcRect t="69313"/>
+            <a:stretch/>
+          </p:blipFill>
+          <p:spPr>
+            <a:xfrm>
+              <a:off x="2167740" y="2298512"/>
+              <a:ext cx="1691640" cy="380690"/>
+            </a:xfrm>
+            <a:prstGeom prst="rect">
+              <a:avLst/>
+            </a:prstGeom>
+          </p:spPr>
+        </p:pic>
+        <p:cxnSp>
+          <p:nvCxnSpPr>
+            <p:cNvPr id="376" name="Straight Connector 375">
+              <a:extLst>
+                <a:ext uri="{FF2B5EF4-FFF2-40B4-BE49-F238E27FC236}">
+                  <a16:creationId xmlns:a16="http://schemas.microsoft.com/office/drawing/2014/main" id="{011C3562-0C70-291C-62EE-A320155BB6B3}"/>
+                </a:ext>
+              </a:extLst>
+            </p:cNvPr>
+            <p:cNvCxnSpPr>
+              <a:cxnSpLocks/>
+            </p:cNvCxnSpPr>
+            <p:nvPr/>
+          </p:nvCxnSpPr>
+          <p:spPr>
+            <a:xfrm flipH="1">
+              <a:off x="2164564" y="1931686"/>
+              <a:ext cx="573117" cy="0"/>
+            </a:xfrm>
+            <a:prstGeom prst="line">
+              <a:avLst/>
+            </a:prstGeom>
+            <a:ln w="12700">
+              <a:solidFill>
+                <a:srgbClr val="FFFFFF"/>
+              </a:solidFill>
+            </a:ln>
+          </p:spPr>
+          <p:style>
+            <a:lnRef idx="1">
+              <a:schemeClr val="accent1"/>
+            </a:lnRef>
+            <a:fillRef idx="0">
+              <a:schemeClr val="accent1"/>
+            </a:fillRef>
+            <a:effectRef idx="0">
+              <a:schemeClr val="accent1"/>
+            </a:effectRef>
+            <a:fontRef idx="minor">
+              <a:schemeClr val="tx1"/>
+            </a:fontRef>
+          </p:style>
+        </p:cxnSp>
+        <p:sp>
+          <p:nvSpPr>
+            <p:cNvPr id="416" name="TextBox 415">
+              <a:extLst>
+                <a:ext uri="{FF2B5EF4-FFF2-40B4-BE49-F238E27FC236}">
+                  <a16:creationId xmlns:a16="http://schemas.microsoft.com/office/drawing/2014/main" id="{9F856B83-D5AE-513D-861B-F4CB3D509120}"/>
+                </a:ext>
+              </a:extLst>
+            </p:cNvPr>
+            <p:cNvSpPr txBox="1"/>
+            <p:nvPr/>
+          </p:nvSpPr>
+          <p:spPr>
+            <a:xfrm>
+              <a:off x="3013518" y="2388309"/>
+              <a:ext cx="287258" cy="184666"/>
+            </a:xfrm>
+            <a:prstGeom prst="rect">
+              <a:avLst/>
+            </a:prstGeom>
+            <a:noFill/>
+          </p:spPr>
+          <p:txBody>
+            <a:bodyPr wrap="none" rtlCol="0">
+              <a:spAutoFit/>
+            </a:bodyPr>
+            <a:lstStyle/>
+            <a:p>
+              <a:r>
+                <a:rPr lang="en-US" sz="600" dirty="0"/>
+                <a:t>Ma</a:t>
+              </a:r>
+            </a:p>
+          </p:txBody>
+        </p:sp>
+      </p:grpSp>
+      <p:grpSp>
+        <p:nvGrpSpPr>
+          <p:cNvPr id="453" name="Group 452">
+            <a:extLst>
+              <a:ext uri="{FF2B5EF4-FFF2-40B4-BE49-F238E27FC236}">
+                <a16:creationId xmlns:a16="http://schemas.microsoft.com/office/drawing/2014/main" id="{A207E0C4-38FA-9A4A-CEA0-6624881CE9E2}"/>
+              </a:ext>
+            </a:extLst>
+          </p:cNvPr>
+          <p:cNvGrpSpPr/>
+          <p:nvPr/>
+        </p:nvGrpSpPr>
+        <p:grpSpPr>
+          <a:xfrm>
+            <a:off x="-91830" y="1596201"/>
+            <a:ext cx="2190109" cy="1113341"/>
+            <a:chOff x="-89292" y="1603599"/>
+            <a:chExt cx="2190109" cy="1113341"/>
+          </a:xfrm>
+        </p:grpSpPr>
+        <p:pic>
+          <p:nvPicPr>
+            <p:cNvPr id="210" name="Picture 209">
+              <a:extLst>
+                <a:ext uri="{FF2B5EF4-FFF2-40B4-BE49-F238E27FC236}">
+                  <a16:creationId xmlns:a16="http://schemas.microsoft.com/office/drawing/2014/main" id="{9060DE45-33FD-D70A-E12E-F1E1B2FB77E2}"/>
+                </a:ext>
+              </a:extLst>
+            </p:cNvPr>
+            <p:cNvPicPr>
+              <a:picLocks/>
+            </p:cNvPicPr>
+            <p:nvPr/>
+          </p:nvPicPr>
+          <p:blipFill rotWithShape="1">
+            <a:blip r:embed="rId13"/>
+            <a:srcRect l="-21342" t="74454" r="21342" b="-3777"/>
+            <a:stretch/>
+          </p:blipFill>
+          <p:spPr>
+            <a:xfrm>
+              <a:off x="-89292" y="2342667"/>
+              <a:ext cx="1805921" cy="374273"/>
+            </a:xfrm>
+            <a:prstGeom prst="rect">
+              <a:avLst/>
+            </a:prstGeom>
+          </p:spPr>
+        </p:pic>
+        <p:pic>
+          <p:nvPicPr>
+            <p:cNvPr id="304" name="Picture 303">
+              <a:extLst>
+                <a:ext uri="{FF2B5EF4-FFF2-40B4-BE49-F238E27FC236}">
+                  <a16:creationId xmlns:a16="http://schemas.microsoft.com/office/drawing/2014/main" id="{0DF41AD3-017A-9DE5-90AE-511F22682109}"/>
+                </a:ext>
+              </a:extLst>
+            </p:cNvPr>
+            <p:cNvPicPr>
+              <a:picLocks noChangeAspect="1"/>
+            </p:cNvPicPr>
+            <p:nvPr/>
+          </p:nvPicPr>
+          <p:blipFill rotWithShape="1">
+            <a:blip r:embed="rId14"/>
+            <a:srcRect b="59683"/>
+            <a:stretch/>
+          </p:blipFill>
+          <p:spPr>
+            <a:xfrm>
+              <a:off x="299093" y="1603599"/>
+              <a:ext cx="1801455" cy="532610"/>
+            </a:xfrm>
+            <a:prstGeom prst="rect">
+              <a:avLst/>
+            </a:prstGeom>
+          </p:spPr>
+        </p:pic>
+        <p:sp>
+          <p:nvSpPr>
+            <p:cNvPr id="414" name="TextBox 413">
+              <a:extLst>
+                <a:ext uri="{FF2B5EF4-FFF2-40B4-BE49-F238E27FC236}">
+                  <a16:creationId xmlns:a16="http://schemas.microsoft.com/office/drawing/2014/main" id="{C00F0A9F-D23A-7704-C9A3-FFF69871048A}"/>
+                </a:ext>
+              </a:extLst>
+            </p:cNvPr>
+            <p:cNvSpPr txBox="1"/>
+            <p:nvPr/>
+          </p:nvSpPr>
+          <p:spPr>
+            <a:xfrm>
+              <a:off x="1203241" y="2373974"/>
+              <a:ext cx="287258" cy="184666"/>
+            </a:xfrm>
+            <a:prstGeom prst="rect">
+              <a:avLst/>
+            </a:prstGeom>
+            <a:noFill/>
+          </p:spPr>
+          <p:txBody>
+            <a:bodyPr wrap="none" rtlCol="0">
+              <a:spAutoFit/>
+            </a:bodyPr>
+            <a:lstStyle/>
+            <a:p>
+              <a:r>
+                <a:rPr lang="en-US" sz="600" dirty="0"/>
+                <a:t>Ma</a:t>
+              </a:r>
+            </a:p>
+          </p:txBody>
+        </p:sp>
+        <p:pic>
+          <p:nvPicPr>
+            <p:cNvPr id="417" name="Picture 416">
+              <a:extLst>
+                <a:ext uri="{FF2B5EF4-FFF2-40B4-BE49-F238E27FC236}">
+                  <a16:creationId xmlns:a16="http://schemas.microsoft.com/office/drawing/2014/main" id="{4FAB2029-710F-A73B-4165-65653F19CBFA}"/>
+                </a:ext>
+              </a:extLst>
+            </p:cNvPr>
+            <p:cNvPicPr>
+              <a:picLocks noChangeAspect="1"/>
+            </p:cNvPicPr>
+            <p:nvPr/>
+          </p:nvPicPr>
+          <p:blipFill rotWithShape="1">
+            <a:blip r:embed="rId15"/>
+            <a:srcRect t="53372" b="30081"/>
+            <a:stretch/>
+          </p:blipFill>
+          <p:spPr>
+            <a:xfrm>
+              <a:off x="299362" y="2118773"/>
+              <a:ext cx="1801455" cy="218604"/>
+            </a:xfrm>
+            <a:prstGeom prst="rect">
+              <a:avLst/>
+            </a:prstGeom>
+          </p:spPr>
+        </p:pic>
+      </p:grpSp>
+      <p:grpSp>
+        <p:nvGrpSpPr>
+          <p:cNvPr id="430" name="Group 429">
+            <a:extLst>
+              <a:ext uri="{FF2B5EF4-FFF2-40B4-BE49-F238E27FC236}">
+                <a16:creationId xmlns:a16="http://schemas.microsoft.com/office/drawing/2014/main" id="{FD9896D2-329B-55D0-191F-B4E45040734C}"/>
+              </a:ext>
+            </a:extLst>
+          </p:cNvPr>
+          <p:cNvGrpSpPr/>
+          <p:nvPr/>
+        </p:nvGrpSpPr>
+        <p:grpSpPr>
+          <a:xfrm>
+            <a:off x="158046" y="2938277"/>
+            <a:ext cx="1761872" cy="1113239"/>
+            <a:chOff x="173921" y="2938277"/>
+            <a:chExt cx="1761872" cy="1113239"/>
+          </a:xfrm>
+        </p:grpSpPr>
+        <p:pic>
+          <p:nvPicPr>
+            <p:cNvPr id="327" name="Picture 326">
+              <a:extLst>
+                <a:ext uri="{FF2B5EF4-FFF2-40B4-BE49-F238E27FC236}">
+                  <a16:creationId xmlns:a16="http://schemas.microsoft.com/office/drawing/2014/main" id="{657BBF80-9F86-ACDE-00D2-545E83751B45}"/>
+                </a:ext>
+              </a:extLst>
+            </p:cNvPr>
+            <p:cNvPicPr>
+              <a:picLocks noChangeAspect="1"/>
+            </p:cNvPicPr>
+            <p:nvPr/>
+          </p:nvPicPr>
+          <p:blipFill rotWithShape="1">
+            <a:blip r:embed="rId16"/>
+            <a:srcRect b="29938"/>
+            <a:stretch/>
+          </p:blipFill>
+          <p:spPr>
+            <a:xfrm>
+              <a:off x="225865" y="2938277"/>
+              <a:ext cx="1709928" cy="878536"/>
+            </a:xfrm>
+            <a:prstGeom prst="rect">
+              <a:avLst/>
+            </a:prstGeom>
+          </p:spPr>
+        </p:pic>
+        <p:pic>
+          <p:nvPicPr>
+            <p:cNvPr id="328" name="Picture 327">
+              <a:extLst>
+                <a:ext uri="{FF2B5EF4-FFF2-40B4-BE49-F238E27FC236}">
+                  <a16:creationId xmlns:a16="http://schemas.microsoft.com/office/drawing/2014/main" id="{96F9ADBF-EAA9-D6F3-F14B-66290CA20D82}"/>
+                </a:ext>
+              </a:extLst>
+            </p:cNvPr>
+            <p:cNvPicPr>
+              <a:picLocks noChangeAspect="1"/>
+            </p:cNvPicPr>
+            <p:nvPr/>
+          </p:nvPicPr>
+          <p:blipFill rotWithShape="1">
+            <a:blip r:embed="rId17"/>
+            <a:srcRect t="72162" b="7286"/>
+            <a:stretch/>
+          </p:blipFill>
+          <p:spPr>
+            <a:xfrm>
+              <a:off x="224889" y="3793792"/>
+              <a:ext cx="1709928" cy="257724"/>
+            </a:xfrm>
+            <a:prstGeom prst="rect">
+              <a:avLst/>
+            </a:prstGeom>
+          </p:spPr>
+        </p:pic>
+        <p:cxnSp>
+          <p:nvCxnSpPr>
+            <p:cNvPr id="364" name="Straight Connector 363">
+              <a:extLst>
+                <a:ext uri="{FF2B5EF4-FFF2-40B4-BE49-F238E27FC236}">
+                  <a16:creationId xmlns:a16="http://schemas.microsoft.com/office/drawing/2014/main" id="{B80AB933-5378-EEBD-9FB9-F14949561744}"/>
+                </a:ext>
+              </a:extLst>
+            </p:cNvPr>
+            <p:cNvCxnSpPr>
+              <a:cxnSpLocks/>
+            </p:cNvCxnSpPr>
+            <p:nvPr/>
+          </p:nvCxnSpPr>
+          <p:spPr>
+            <a:xfrm flipH="1">
+              <a:off x="245375" y="3516086"/>
+              <a:ext cx="607433" cy="0"/>
+            </a:xfrm>
+            <a:prstGeom prst="line">
+              <a:avLst/>
+            </a:prstGeom>
+            <a:ln w="12700">
+              <a:solidFill>
+                <a:srgbClr val="FFFFFF"/>
+              </a:solidFill>
+            </a:ln>
+          </p:spPr>
+          <p:style>
+            <a:lnRef idx="1">
+              <a:schemeClr val="accent1"/>
+            </a:lnRef>
+            <a:fillRef idx="0">
+              <a:schemeClr val="accent1"/>
+            </a:fillRef>
+            <a:effectRef idx="0">
+              <a:schemeClr val="accent1"/>
+            </a:effectRef>
+            <a:fontRef idx="minor">
+              <a:schemeClr val="tx1"/>
+            </a:fontRef>
+          </p:style>
+        </p:cxnSp>
+        <p:sp>
+          <p:nvSpPr>
+            <p:cNvPr id="411" name="TextBox 410">
+              <a:extLst>
+                <a:ext uri="{FF2B5EF4-FFF2-40B4-BE49-F238E27FC236}">
+                  <a16:creationId xmlns:a16="http://schemas.microsoft.com/office/drawing/2014/main" id="{29AF859D-974A-489B-EAC7-B01C66153D31}"/>
+                </a:ext>
+              </a:extLst>
+            </p:cNvPr>
+            <p:cNvSpPr txBox="1"/>
+            <p:nvPr/>
+          </p:nvSpPr>
+          <p:spPr>
+            <a:xfrm>
+              <a:off x="1081971" y="3797152"/>
+              <a:ext cx="287258" cy="184666"/>
+            </a:xfrm>
+            <a:prstGeom prst="rect">
+              <a:avLst/>
+            </a:prstGeom>
+            <a:noFill/>
+          </p:spPr>
+          <p:txBody>
+            <a:bodyPr wrap="none" rtlCol="0">
+              <a:spAutoFit/>
+            </a:bodyPr>
+            <a:lstStyle/>
+            <a:p>
+              <a:r>
+                <a:rPr lang="en-US" sz="600" dirty="0"/>
+                <a:t>Ma</a:t>
+              </a:r>
+            </a:p>
+          </p:txBody>
+        </p:sp>
+        <p:sp>
+          <p:nvSpPr>
+            <p:cNvPr id="228" name="TextBox 227">
+              <a:extLst>
+                <a:ext uri="{FF2B5EF4-FFF2-40B4-BE49-F238E27FC236}">
+                  <a16:creationId xmlns:a16="http://schemas.microsoft.com/office/drawing/2014/main" id="{1B9A69D6-799C-FB1A-D0BA-029E81151F8D}"/>
+                </a:ext>
+              </a:extLst>
+            </p:cNvPr>
+            <p:cNvSpPr txBox="1"/>
+            <p:nvPr/>
+          </p:nvSpPr>
+          <p:spPr>
+            <a:xfrm>
+              <a:off x="173921" y="3000024"/>
+              <a:ext cx="705642" cy="200055"/>
+            </a:xfrm>
+            <a:prstGeom prst="rect">
+              <a:avLst/>
+            </a:prstGeom>
+            <a:noFill/>
+          </p:spPr>
+          <p:txBody>
+            <a:bodyPr wrap="none" rtlCol="0">
+              <a:spAutoFit/>
+            </a:bodyPr>
+            <a:lstStyle/>
+            <a:p>
+              <a:r>
+                <a:rPr lang="en-US" sz="700" dirty="0"/>
+                <a:t>chronogram 1</a:t>
+              </a:r>
+            </a:p>
+          </p:txBody>
+        </p:sp>
+      </p:grpSp>
+      <p:grpSp>
+        <p:nvGrpSpPr>
+          <p:cNvPr id="468" name="Group 467">
+            <a:extLst>
+              <a:ext uri="{FF2B5EF4-FFF2-40B4-BE49-F238E27FC236}">
+                <a16:creationId xmlns:a16="http://schemas.microsoft.com/office/drawing/2014/main" id="{0D491197-ABA6-A07F-9EDE-1F07F407BF8D}"/>
+              </a:ext>
+            </a:extLst>
+          </p:cNvPr>
+          <p:cNvGrpSpPr/>
+          <p:nvPr/>
+        </p:nvGrpSpPr>
+        <p:grpSpPr>
+          <a:xfrm>
+            <a:off x="4105837" y="4019016"/>
+            <a:ext cx="1783425" cy="1103681"/>
+            <a:chOff x="4099487" y="4019016"/>
+            <a:chExt cx="1783425" cy="1103681"/>
+          </a:xfrm>
+        </p:grpSpPr>
+        <p:pic>
+          <p:nvPicPr>
+            <p:cNvPr id="355" name="Picture 354">
+              <a:extLst>
+                <a:ext uri="{FF2B5EF4-FFF2-40B4-BE49-F238E27FC236}">
+                  <a16:creationId xmlns:a16="http://schemas.microsoft.com/office/drawing/2014/main" id="{891CEC6F-C89F-C9DF-C776-3AC9C3C303BA}"/>
+                </a:ext>
+              </a:extLst>
+            </p:cNvPr>
+            <p:cNvPicPr>
+              <a:picLocks noChangeAspect="1"/>
+            </p:cNvPicPr>
+            <p:nvPr/>
+          </p:nvPicPr>
+          <p:blipFill rotWithShape="1">
+            <a:blip r:embed="rId18"/>
+            <a:srcRect b="28891"/>
+            <a:stretch/>
+          </p:blipFill>
+          <p:spPr>
+            <a:xfrm>
+              <a:off x="4163567" y="4019016"/>
+              <a:ext cx="1719072" cy="896431"/>
+            </a:xfrm>
+            <a:prstGeom prst="rect">
+              <a:avLst/>
+            </a:prstGeom>
+          </p:spPr>
+        </p:pic>
+        <p:pic>
+          <p:nvPicPr>
+            <p:cNvPr id="357" name="Picture 356">
+              <a:extLst>
+                <a:ext uri="{FF2B5EF4-FFF2-40B4-BE49-F238E27FC236}">
+                  <a16:creationId xmlns:a16="http://schemas.microsoft.com/office/drawing/2014/main" id="{06CCD8ED-AC29-09BB-8D70-0A7B214D67C8}"/>
+                </a:ext>
+              </a:extLst>
+            </p:cNvPr>
+            <p:cNvPicPr>
+              <a:picLocks noChangeAspect="1"/>
+            </p:cNvPicPr>
+            <p:nvPr/>
+          </p:nvPicPr>
+          <p:blipFill rotWithShape="1">
+            <a:blip r:embed="rId19"/>
+            <a:srcRect t="73753" b="8457"/>
+            <a:stretch/>
+          </p:blipFill>
+          <p:spPr>
+            <a:xfrm>
+              <a:off x="4163840" y="4898435"/>
+              <a:ext cx="1719072" cy="224262"/>
+            </a:xfrm>
+            <a:prstGeom prst="rect">
+              <a:avLst/>
+            </a:prstGeom>
+          </p:spPr>
+        </p:pic>
+        <p:cxnSp>
+          <p:nvCxnSpPr>
+            <p:cNvPr id="371" name="Straight Connector 370">
+              <a:extLst>
+                <a:ext uri="{FF2B5EF4-FFF2-40B4-BE49-F238E27FC236}">
+                  <a16:creationId xmlns:a16="http://schemas.microsoft.com/office/drawing/2014/main" id="{2D80C718-288D-C0E2-2A82-AE538DB72BCD}"/>
+                </a:ext>
+              </a:extLst>
+            </p:cNvPr>
+            <p:cNvCxnSpPr>
+              <a:cxnSpLocks/>
+            </p:cNvCxnSpPr>
+            <p:nvPr/>
+          </p:nvCxnSpPr>
+          <p:spPr>
+            <a:xfrm flipH="1">
+              <a:off x="4192314" y="4565503"/>
+              <a:ext cx="694551" cy="0"/>
+            </a:xfrm>
+            <a:prstGeom prst="line">
+              <a:avLst/>
+            </a:prstGeom>
+            <a:ln w="12700">
+              <a:solidFill>
+                <a:srgbClr val="FFFFFF"/>
+              </a:solidFill>
+            </a:ln>
+          </p:spPr>
+          <p:style>
+            <a:lnRef idx="1">
+              <a:schemeClr val="accent1"/>
+            </a:lnRef>
+            <a:fillRef idx="0">
+              <a:schemeClr val="accent1"/>
+            </a:fillRef>
+            <a:effectRef idx="0">
+              <a:schemeClr val="accent1"/>
+            </a:effectRef>
+            <a:fontRef idx="minor">
+              <a:schemeClr val="tx1"/>
+            </a:fontRef>
+          </p:style>
+        </p:cxnSp>
+        <p:sp>
+          <p:nvSpPr>
+            <p:cNvPr id="409" name="TextBox 408">
+              <a:extLst>
+                <a:ext uri="{FF2B5EF4-FFF2-40B4-BE49-F238E27FC236}">
+                  <a16:creationId xmlns:a16="http://schemas.microsoft.com/office/drawing/2014/main" id="{BC8B053C-0F26-79ED-A3AA-92787C71CC05}"/>
+                </a:ext>
+              </a:extLst>
+            </p:cNvPr>
+            <p:cNvSpPr txBox="1"/>
+            <p:nvPr/>
+          </p:nvSpPr>
+          <p:spPr>
+            <a:xfrm>
+              <a:off x="5036630" y="4877456"/>
+              <a:ext cx="287258" cy="184666"/>
+            </a:xfrm>
+            <a:prstGeom prst="rect">
+              <a:avLst/>
+            </a:prstGeom>
+            <a:noFill/>
+          </p:spPr>
+          <p:txBody>
+            <a:bodyPr wrap="none" rtlCol="0">
+              <a:spAutoFit/>
+            </a:bodyPr>
+            <a:lstStyle/>
+            <a:p>
+              <a:r>
+                <a:rPr lang="en-US" sz="600" dirty="0"/>
+                <a:t>Ma</a:t>
+              </a:r>
+            </a:p>
+          </p:txBody>
+        </p:sp>
+        <p:sp>
+          <p:nvSpPr>
+            <p:cNvPr id="227" name="TextBox 226">
+              <a:extLst>
+                <a:ext uri="{FF2B5EF4-FFF2-40B4-BE49-F238E27FC236}">
+                  <a16:creationId xmlns:a16="http://schemas.microsoft.com/office/drawing/2014/main" id="{F340506E-8F49-8B5B-09EA-A89ABBF2A2E1}"/>
+                </a:ext>
+              </a:extLst>
+            </p:cNvPr>
+            <p:cNvSpPr txBox="1"/>
+            <p:nvPr/>
+          </p:nvSpPr>
+          <p:spPr>
+            <a:xfrm>
+              <a:off x="4099487" y="4103901"/>
+              <a:ext cx="705642" cy="200055"/>
+            </a:xfrm>
+            <a:prstGeom prst="rect">
+              <a:avLst/>
+            </a:prstGeom>
+            <a:noFill/>
+          </p:spPr>
+          <p:txBody>
+            <a:bodyPr wrap="none" rtlCol="0">
+              <a:spAutoFit/>
+            </a:bodyPr>
+            <a:lstStyle/>
+            <a:p>
+              <a:r>
+                <a:rPr lang="en-US" sz="700" dirty="0"/>
+                <a:t>chronogram 2</a:t>
+              </a:r>
+            </a:p>
+          </p:txBody>
+        </p:sp>
+      </p:grpSp>
+      <p:grpSp>
+        <p:nvGrpSpPr>
+          <p:cNvPr id="429" name="Group 428">
+            <a:extLst>
+              <a:ext uri="{FF2B5EF4-FFF2-40B4-BE49-F238E27FC236}">
+                <a16:creationId xmlns:a16="http://schemas.microsoft.com/office/drawing/2014/main" id="{E01FEAC0-7CC7-40C8-F31D-5779587402F3}"/>
+              </a:ext>
+            </a:extLst>
+          </p:cNvPr>
+          <p:cNvGrpSpPr/>
+          <p:nvPr/>
+        </p:nvGrpSpPr>
+        <p:grpSpPr>
+          <a:xfrm>
+            <a:off x="2119361" y="4048746"/>
+            <a:ext cx="1778102" cy="1135161"/>
+            <a:chOff x="2154286" y="4032871"/>
+            <a:chExt cx="1778102" cy="1135161"/>
+          </a:xfrm>
+        </p:grpSpPr>
+        <p:pic>
+          <p:nvPicPr>
+            <p:cNvPr id="350" name="Picture 349">
+              <a:extLst>
+                <a:ext uri="{FF2B5EF4-FFF2-40B4-BE49-F238E27FC236}">
+                  <a16:creationId xmlns:a16="http://schemas.microsoft.com/office/drawing/2014/main" id="{98BE78FA-8C0B-AE9E-6E8A-0A970298C5E7}"/>
+                </a:ext>
+              </a:extLst>
+            </p:cNvPr>
+            <p:cNvPicPr>
+              <a:picLocks noChangeAspect="1"/>
+            </p:cNvPicPr>
+            <p:nvPr/>
+          </p:nvPicPr>
+          <p:blipFill rotWithShape="1">
+            <a:blip r:embed="rId20"/>
+            <a:srcRect b="28672"/>
+            <a:stretch/>
+          </p:blipFill>
+          <p:spPr>
+            <a:xfrm>
+              <a:off x="2213316" y="4032871"/>
+              <a:ext cx="1719072" cy="899197"/>
+            </a:xfrm>
+            <a:prstGeom prst="rect">
+              <a:avLst/>
+            </a:prstGeom>
+          </p:spPr>
+        </p:pic>
+        <p:pic>
+          <p:nvPicPr>
+            <p:cNvPr id="358" name="Picture 357">
+              <a:extLst>
+                <a:ext uri="{FF2B5EF4-FFF2-40B4-BE49-F238E27FC236}">
+                  <a16:creationId xmlns:a16="http://schemas.microsoft.com/office/drawing/2014/main" id="{50FF4DD6-75D5-8C75-8397-E3999BBD6EB2}"/>
+                </a:ext>
+              </a:extLst>
+            </p:cNvPr>
+            <p:cNvPicPr>
+              <a:picLocks noChangeAspect="1"/>
+            </p:cNvPicPr>
+            <p:nvPr/>
+          </p:nvPicPr>
+          <p:blipFill rotWithShape="1">
+            <a:blip r:embed="rId21"/>
+            <a:srcRect t="77111" r="36938"/>
+            <a:stretch/>
+          </p:blipFill>
+          <p:spPr>
+            <a:xfrm>
+              <a:off x="2211730" y="4879480"/>
+              <a:ext cx="1084088" cy="288552"/>
+            </a:xfrm>
+            <a:prstGeom prst="rect">
+              <a:avLst/>
+            </a:prstGeom>
+          </p:spPr>
+        </p:pic>
+        <p:cxnSp>
+          <p:nvCxnSpPr>
+            <p:cNvPr id="368" name="Straight Connector 367">
+              <a:extLst>
+                <a:ext uri="{FF2B5EF4-FFF2-40B4-BE49-F238E27FC236}">
+                  <a16:creationId xmlns:a16="http://schemas.microsoft.com/office/drawing/2014/main" id="{0AC1AC17-F557-3DE1-1C83-883EF993E0FD}"/>
+                </a:ext>
+              </a:extLst>
+            </p:cNvPr>
+            <p:cNvCxnSpPr>
+              <a:cxnSpLocks/>
+            </p:cNvCxnSpPr>
+            <p:nvPr/>
+          </p:nvCxnSpPr>
+          <p:spPr>
+            <a:xfrm flipH="1">
+              <a:off x="2228489" y="4561107"/>
+              <a:ext cx="467055" cy="0"/>
+            </a:xfrm>
+            <a:prstGeom prst="line">
+              <a:avLst/>
+            </a:prstGeom>
+            <a:ln w="19050">
+              <a:solidFill>
+                <a:srgbClr val="FFFFFF"/>
+              </a:solidFill>
+            </a:ln>
+          </p:spPr>
+          <p:style>
+            <a:lnRef idx="1">
+              <a:schemeClr val="accent1"/>
+            </a:lnRef>
+            <a:fillRef idx="0">
+              <a:schemeClr val="accent1"/>
+            </a:fillRef>
+            <a:effectRef idx="0">
+              <a:schemeClr val="accent1"/>
+            </a:effectRef>
+            <a:fontRef idx="minor">
+              <a:schemeClr val="tx1"/>
+            </a:fontRef>
+          </p:style>
+        </p:cxnSp>
+        <p:sp>
+          <p:nvSpPr>
+            <p:cNvPr id="408" name="TextBox 407">
+              <a:extLst>
+                <a:ext uri="{FF2B5EF4-FFF2-40B4-BE49-F238E27FC236}">
+                  <a16:creationId xmlns:a16="http://schemas.microsoft.com/office/drawing/2014/main" id="{A9478CD5-44FE-4B1B-24C6-E481A541AFB4}"/>
+                </a:ext>
+              </a:extLst>
+            </p:cNvPr>
+            <p:cNvSpPr txBox="1"/>
+            <p:nvPr/>
+          </p:nvSpPr>
+          <p:spPr>
+            <a:xfrm>
+              <a:off x="3075461" y="4866908"/>
+              <a:ext cx="287258" cy="184666"/>
+            </a:xfrm>
+            <a:prstGeom prst="rect">
+              <a:avLst/>
+            </a:prstGeom>
+            <a:noFill/>
+          </p:spPr>
+          <p:txBody>
+            <a:bodyPr wrap="none" rtlCol="0">
+              <a:spAutoFit/>
+            </a:bodyPr>
+            <a:lstStyle/>
+            <a:p>
+              <a:r>
+                <a:rPr lang="en-US" sz="600" dirty="0"/>
+                <a:t>Ma</a:t>
+              </a:r>
+            </a:p>
+          </p:txBody>
+        </p:sp>
+        <p:sp>
+          <p:nvSpPr>
+            <p:cNvPr id="225" name="TextBox 224">
+              <a:extLst>
+                <a:ext uri="{FF2B5EF4-FFF2-40B4-BE49-F238E27FC236}">
+                  <a16:creationId xmlns:a16="http://schemas.microsoft.com/office/drawing/2014/main" id="{0827614C-0F26-F277-F12E-A26D69F42679}"/>
+                </a:ext>
+              </a:extLst>
+            </p:cNvPr>
+            <p:cNvSpPr txBox="1"/>
+            <p:nvPr/>
+          </p:nvSpPr>
+          <p:spPr>
+            <a:xfrm>
+              <a:off x="2154286" y="4088026"/>
+              <a:ext cx="705642" cy="200055"/>
+            </a:xfrm>
+            <a:prstGeom prst="rect">
+              <a:avLst/>
+            </a:prstGeom>
+            <a:noFill/>
+          </p:spPr>
+          <p:txBody>
+            <a:bodyPr wrap="none" rtlCol="0">
+              <a:spAutoFit/>
+            </a:bodyPr>
+            <a:lstStyle/>
+            <a:p>
+              <a:r>
+                <a:rPr lang="en-US" sz="700" dirty="0"/>
+                <a:t>chronogram 2</a:t>
+              </a:r>
+            </a:p>
+          </p:txBody>
+        </p:sp>
+      </p:grpSp>
+      <p:grpSp>
+        <p:nvGrpSpPr>
+          <p:cNvPr id="428" name="Group 427">
+            <a:extLst>
+              <a:ext uri="{FF2B5EF4-FFF2-40B4-BE49-F238E27FC236}">
+                <a16:creationId xmlns:a16="http://schemas.microsoft.com/office/drawing/2014/main" id="{903A1728-E7D9-BEEC-4FF4-E616745FF3AA}"/>
+              </a:ext>
+            </a:extLst>
+          </p:cNvPr>
+          <p:cNvGrpSpPr/>
+          <p:nvPr/>
+        </p:nvGrpSpPr>
+        <p:grpSpPr>
+          <a:xfrm>
+            <a:off x="2106070" y="2948170"/>
+            <a:ext cx="1790052" cy="1215920"/>
+            <a:chOff x="2121945" y="2948170"/>
+            <a:chExt cx="1790052" cy="1215920"/>
+          </a:xfrm>
+        </p:grpSpPr>
+        <p:pic>
+          <p:nvPicPr>
+            <p:cNvPr id="349" name="Picture 348">
+              <a:extLst>
+                <a:ext uri="{FF2B5EF4-FFF2-40B4-BE49-F238E27FC236}">
+                  <a16:creationId xmlns:a16="http://schemas.microsoft.com/office/drawing/2014/main" id="{3D8DF49E-7E84-EFD3-D70E-D6F15534398B}"/>
+                </a:ext>
+              </a:extLst>
+            </p:cNvPr>
+            <p:cNvPicPr>
+              <a:picLocks noChangeAspect="1"/>
+            </p:cNvPicPr>
+            <p:nvPr/>
+          </p:nvPicPr>
+          <p:blipFill rotWithShape="1">
+            <a:blip r:embed="rId22"/>
+            <a:srcRect t="70537" r="36696" b="-1734"/>
+            <a:stretch/>
+          </p:blipFill>
+          <p:spPr>
+            <a:xfrm>
+              <a:off x="2192464" y="3770797"/>
+              <a:ext cx="1088235" cy="393293"/>
+            </a:xfrm>
+            <a:prstGeom prst="rect">
+              <a:avLst/>
+            </a:prstGeom>
+          </p:spPr>
+        </p:pic>
+        <p:sp>
+          <p:nvSpPr>
+            <p:cNvPr id="415" name="TextBox 414">
+              <a:extLst>
+                <a:ext uri="{FF2B5EF4-FFF2-40B4-BE49-F238E27FC236}">
+                  <a16:creationId xmlns:a16="http://schemas.microsoft.com/office/drawing/2014/main" id="{DE353DA3-EB4C-38B2-D959-B64EAD95CA7D}"/>
+                </a:ext>
+              </a:extLst>
+            </p:cNvPr>
+            <p:cNvSpPr txBox="1"/>
+            <p:nvPr/>
+          </p:nvSpPr>
+          <p:spPr>
+            <a:xfrm>
+              <a:off x="3048835" y="3795482"/>
+              <a:ext cx="287258" cy="184666"/>
+            </a:xfrm>
+            <a:prstGeom prst="rect">
+              <a:avLst/>
+            </a:prstGeom>
+            <a:noFill/>
+          </p:spPr>
+          <p:txBody>
+            <a:bodyPr wrap="none" rtlCol="0">
+              <a:spAutoFit/>
+            </a:bodyPr>
+            <a:lstStyle/>
+            <a:p>
+              <a:r>
+                <a:rPr lang="en-US" sz="600" dirty="0"/>
+                <a:t>Ma</a:t>
+              </a:r>
+            </a:p>
+          </p:txBody>
+        </p:sp>
+        <p:sp>
+          <p:nvSpPr>
+            <p:cNvPr id="224" name="TextBox 223">
+              <a:extLst>
+                <a:ext uri="{FF2B5EF4-FFF2-40B4-BE49-F238E27FC236}">
+                  <a16:creationId xmlns:a16="http://schemas.microsoft.com/office/drawing/2014/main" id="{688D2BAB-6744-933D-B4D8-A20412858F86}"/>
+                </a:ext>
+              </a:extLst>
+            </p:cNvPr>
+            <p:cNvSpPr txBox="1"/>
+            <p:nvPr/>
+          </p:nvSpPr>
+          <p:spPr>
+            <a:xfrm>
+              <a:off x="2121945" y="2993353"/>
+              <a:ext cx="705642" cy="200055"/>
+            </a:xfrm>
+            <a:prstGeom prst="rect">
+              <a:avLst/>
+            </a:prstGeom>
+            <a:noFill/>
+          </p:spPr>
+          <p:txBody>
+            <a:bodyPr wrap="none" rtlCol="0">
+              <a:spAutoFit/>
+            </a:bodyPr>
+            <a:lstStyle/>
+            <a:p>
+              <a:r>
+                <a:rPr lang="en-US" sz="700" dirty="0"/>
+                <a:t>chronogram 1</a:t>
+              </a:r>
+            </a:p>
+          </p:txBody>
+        </p:sp>
+        <p:pic>
+          <p:nvPicPr>
+            <p:cNvPr id="421" name="Picture 420">
+              <a:extLst>
+                <a:ext uri="{FF2B5EF4-FFF2-40B4-BE49-F238E27FC236}">
+                  <a16:creationId xmlns:a16="http://schemas.microsoft.com/office/drawing/2014/main" id="{B17FDC8F-3C4C-E7F5-3FC7-5B6521EC25A6}"/>
+                </a:ext>
+              </a:extLst>
+            </p:cNvPr>
+            <p:cNvPicPr>
+              <a:picLocks noChangeAspect="1"/>
+            </p:cNvPicPr>
+            <p:nvPr/>
+          </p:nvPicPr>
+          <p:blipFill rotWithShape="1">
+            <a:blip r:embed="rId23"/>
+            <a:srcRect b="29699"/>
+            <a:stretch/>
+          </p:blipFill>
+          <p:spPr>
+            <a:xfrm>
+              <a:off x="2192925" y="2948170"/>
+              <a:ext cx="1719072" cy="886242"/>
+            </a:xfrm>
+            <a:prstGeom prst="rect">
+              <a:avLst/>
+            </a:prstGeom>
+          </p:spPr>
+        </p:pic>
+        <p:cxnSp>
+          <p:nvCxnSpPr>
+            <p:cNvPr id="370" name="Straight Connector 369">
+              <a:extLst>
+                <a:ext uri="{FF2B5EF4-FFF2-40B4-BE49-F238E27FC236}">
+                  <a16:creationId xmlns:a16="http://schemas.microsoft.com/office/drawing/2014/main" id="{9687EACA-A26B-5B64-FDDA-F2B706AC369F}"/>
+                </a:ext>
+              </a:extLst>
+            </p:cNvPr>
+            <p:cNvCxnSpPr>
+              <a:cxnSpLocks/>
+            </p:cNvCxnSpPr>
+            <p:nvPr/>
+          </p:nvCxnSpPr>
+          <p:spPr>
+            <a:xfrm flipH="1">
+              <a:off x="2199489" y="3534159"/>
+              <a:ext cx="467055" cy="0"/>
+            </a:xfrm>
+            <a:prstGeom prst="line">
+              <a:avLst/>
+            </a:prstGeom>
+            <a:ln w="12700">
+              <a:solidFill>
+                <a:srgbClr val="FFFFFF"/>
+              </a:solidFill>
+            </a:ln>
+          </p:spPr>
+          <p:style>
+            <a:lnRef idx="1">
+              <a:schemeClr val="accent1"/>
+            </a:lnRef>
+            <a:fillRef idx="0">
+              <a:schemeClr val="accent1"/>
+            </a:fillRef>
+            <a:effectRef idx="0">
+              <a:schemeClr val="accent1"/>
+            </a:effectRef>
+            <a:fontRef idx="minor">
+              <a:schemeClr val="tx1"/>
+            </a:fontRef>
+          </p:style>
+        </p:cxnSp>
+      </p:grpSp>
+      <p:grpSp>
+        <p:nvGrpSpPr>
+          <p:cNvPr id="427" name="Group 426">
+            <a:extLst>
+              <a:ext uri="{FF2B5EF4-FFF2-40B4-BE49-F238E27FC236}">
+                <a16:creationId xmlns:a16="http://schemas.microsoft.com/office/drawing/2014/main" id="{82129198-3D8E-341D-351C-59C106E3C34C}"/>
+              </a:ext>
+            </a:extLst>
+          </p:cNvPr>
+          <p:cNvGrpSpPr/>
+          <p:nvPr/>
+        </p:nvGrpSpPr>
+        <p:grpSpPr>
+          <a:xfrm>
+            <a:off x="4100659" y="2950643"/>
+            <a:ext cx="1788057" cy="1081255"/>
+            <a:chOff x="4116534" y="2956993"/>
+            <a:chExt cx="1788057" cy="1081255"/>
+          </a:xfrm>
+        </p:grpSpPr>
+        <p:pic>
+          <p:nvPicPr>
+            <p:cNvPr id="354" name="Picture 353">
+              <a:extLst>
+                <a:ext uri="{FF2B5EF4-FFF2-40B4-BE49-F238E27FC236}">
+                  <a16:creationId xmlns:a16="http://schemas.microsoft.com/office/drawing/2014/main" id="{17CA14A5-161C-564F-5AD8-0CFA9B753D5C}"/>
+                </a:ext>
+              </a:extLst>
+            </p:cNvPr>
+            <p:cNvPicPr>
+              <a:picLocks noChangeAspect="1"/>
+            </p:cNvPicPr>
+            <p:nvPr/>
+          </p:nvPicPr>
+          <p:blipFill rotWithShape="1">
+            <a:blip r:embed="rId24"/>
+            <a:srcRect t="73564" b="9191"/>
+            <a:stretch/>
+          </p:blipFill>
+          <p:spPr>
+            <a:xfrm>
+              <a:off x="4185519" y="3820847"/>
+              <a:ext cx="1719072" cy="217401"/>
+            </a:xfrm>
+            <a:prstGeom prst="rect">
+              <a:avLst/>
+            </a:prstGeom>
+          </p:spPr>
+        </p:pic>
+        <p:sp>
+          <p:nvSpPr>
+            <p:cNvPr id="226" name="TextBox 225">
+              <a:extLst>
+                <a:ext uri="{FF2B5EF4-FFF2-40B4-BE49-F238E27FC236}">
+                  <a16:creationId xmlns:a16="http://schemas.microsoft.com/office/drawing/2014/main" id="{4FDBD919-AD97-B25F-3647-1D59938A2F85}"/>
+                </a:ext>
+              </a:extLst>
+            </p:cNvPr>
+            <p:cNvSpPr txBox="1"/>
+            <p:nvPr/>
+          </p:nvSpPr>
+          <p:spPr>
+            <a:xfrm>
+              <a:off x="4116534" y="2999703"/>
+              <a:ext cx="705642" cy="200055"/>
+            </a:xfrm>
+            <a:prstGeom prst="rect">
+              <a:avLst/>
+            </a:prstGeom>
+            <a:noFill/>
+          </p:spPr>
+          <p:txBody>
+            <a:bodyPr wrap="none" rtlCol="0">
+              <a:spAutoFit/>
+            </a:bodyPr>
+            <a:lstStyle/>
+            <a:p>
+              <a:r>
+                <a:rPr lang="en-US" sz="700" dirty="0"/>
+                <a:t>chronogram 1</a:t>
+              </a:r>
+            </a:p>
+          </p:txBody>
+        </p:sp>
+        <p:pic>
+          <p:nvPicPr>
+            <p:cNvPr id="422" name="Picture 421">
+              <a:extLst>
+                <a:ext uri="{FF2B5EF4-FFF2-40B4-BE49-F238E27FC236}">
+                  <a16:creationId xmlns:a16="http://schemas.microsoft.com/office/drawing/2014/main" id="{5212E244-8D1F-187C-5575-30D620B1ABEA}"/>
+                </a:ext>
+              </a:extLst>
+            </p:cNvPr>
+            <p:cNvPicPr>
+              <a:picLocks noChangeAspect="1"/>
+            </p:cNvPicPr>
+            <p:nvPr/>
+          </p:nvPicPr>
+          <p:blipFill rotWithShape="1">
+            <a:blip r:embed="rId25"/>
+            <a:srcRect b="25316"/>
+            <a:stretch/>
+          </p:blipFill>
+          <p:spPr>
+            <a:xfrm>
+              <a:off x="4185519" y="2956993"/>
+              <a:ext cx="1719072" cy="941495"/>
+            </a:xfrm>
+            <a:prstGeom prst="rect">
+              <a:avLst/>
+            </a:prstGeom>
+          </p:spPr>
+        </p:pic>
+        <p:cxnSp>
+          <p:nvCxnSpPr>
+            <p:cNvPr id="373" name="Straight Connector 372">
+              <a:extLst>
+                <a:ext uri="{FF2B5EF4-FFF2-40B4-BE49-F238E27FC236}">
+                  <a16:creationId xmlns:a16="http://schemas.microsoft.com/office/drawing/2014/main" id="{B528E208-187C-F732-71BA-543A5F211C64}"/>
+                </a:ext>
+              </a:extLst>
+            </p:cNvPr>
+            <p:cNvCxnSpPr>
+              <a:cxnSpLocks/>
+            </p:cNvCxnSpPr>
+            <p:nvPr/>
+          </p:nvCxnSpPr>
+          <p:spPr>
+            <a:xfrm flipH="1">
+              <a:off x="4211301" y="3463773"/>
+              <a:ext cx="467055" cy="0"/>
+            </a:xfrm>
+            <a:prstGeom prst="line">
+              <a:avLst/>
+            </a:prstGeom>
+            <a:ln w="19050">
+              <a:solidFill>
+                <a:srgbClr val="FFFFFF"/>
+              </a:solidFill>
+            </a:ln>
+          </p:spPr>
+          <p:style>
+            <a:lnRef idx="1">
+              <a:schemeClr val="accent1"/>
+            </a:lnRef>
+            <a:fillRef idx="0">
+              <a:schemeClr val="accent1"/>
+            </a:fillRef>
+            <a:effectRef idx="0">
+              <a:schemeClr val="accent1"/>
+            </a:effectRef>
+            <a:fontRef idx="minor">
+              <a:schemeClr val="tx1"/>
+            </a:fontRef>
+          </p:style>
+        </p:cxnSp>
+        <p:sp>
+          <p:nvSpPr>
+            <p:cNvPr id="425" name="TextBox 424">
+              <a:extLst>
+                <a:ext uri="{FF2B5EF4-FFF2-40B4-BE49-F238E27FC236}">
+                  <a16:creationId xmlns:a16="http://schemas.microsoft.com/office/drawing/2014/main" id="{5EFCEAC0-5AA4-6B36-0558-1AECFE9E8B16}"/>
+                </a:ext>
+              </a:extLst>
+            </p:cNvPr>
+            <p:cNvSpPr txBox="1"/>
+            <p:nvPr/>
+          </p:nvSpPr>
+          <p:spPr>
+            <a:xfrm>
+              <a:off x="5052963" y="3799945"/>
+              <a:ext cx="287258" cy="184666"/>
+            </a:xfrm>
+            <a:prstGeom prst="rect">
+              <a:avLst/>
+            </a:prstGeom>
+            <a:noFill/>
+          </p:spPr>
+          <p:txBody>
+            <a:bodyPr wrap="none" rtlCol="0">
+              <a:spAutoFit/>
+            </a:bodyPr>
+            <a:lstStyle/>
+            <a:p>
+              <a:r>
+                <a:rPr lang="en-US" sz="600" dirty="0"/>
+                <a:t>Ma</a:t>
+              </a:r>
+            </a:p>
+          </p:txBody>
+        </p:sp>
+      </p:grpSp>
+      <p:grpSp>
+        <p:nvGrpSpPr>
+          <p:cNvPr id="433" name="Group 432">
+            <a:extLst>
+              <a:ext uri="{FF2B5EF4-FFF2-40B4-BE49-F238E27FC236}">
+                <a16:creationId xmlns:a16="http://schemas.microsoft.com/office/drawing/2014/main" id="{A97505F0-0E1D-99C6-4159-167348D00F67}"/>
+              </a:ext>
+            </a:extLst>
+          </p:cNvPr>
+          <p:cNvGrpSpPr/>
+          <p:nvPr/>
+        </p:nvGrpSpPr>
+        <p:grpSpPr>
+          <a:xfrm>
+            <a:off x="157596" y="4010690"/>
+            <a:ext cx="1760750" cy="1103216"/>
+            <a:chOff x="182996" y="4010690"/>
+            <a:chExt cx="1760750" cy="1103216"/>
+          </a:xfrm>
+        </p:grpSpPr>
+        <p:pic>
+          <p:nvPicPr>
+            <p:cNvPr id="326" name="Picture 325">
+              <a:extLst>
+                <a:ext uri="{FF2B5EF4-FFF2-40B4-BE49-F238E27FC236}">
+                  <a16:creationId xmlns:a16="http://schemas.microsoft.com/office/drawing/2014/main" id="{3D8E5BE9-3E26-1A07-54F0-F19E6FC1BD83}"/>
+                </a:ext>
+              </a:extLst>
+            </p:cNvPr>
+            <p:cNvPicPr>
+              <a:picLocks noChangeAspect="1"/>
+            </p:cNvPicPr>
+            <p:nvPr/>
+          </p:nvPicPr>
+          <p:blipFill rotWithShape="1">
+            <a:blip r:embed="rId26"/>
+            <a:srcRect t="71149" b="8852"/>
+            <a:stretch/>
+          </p:blipFill>
+          <p:spPr>
+            <a:xfrm>
+              <a:off x="233652" y="4863139"/>
+              <a:ext cx="1709928" cy="250767"/>
+            </a:xfrm>
+            <a:prstGeom prst="rect">
+              <a:avLst/>
+            </a:prstGeom>
+          </p:spPr>
+        </p:pic>
+        <p:sp>
+          <p:nvSpPr>
+            <p:cNvPr id="410" name="TextBox 409">
+              <a:extLst>
+                <a:ext uri="{FF2B5EF4-FFF2-40B4-BE49-F238E27FC236}">
+                  <a16:creationId xmlns:a16="http://schemas.microsoft.com/office/drawing/2014/main" id="{06E6C1C6-21A0-5E81-107E-E8F8135D3611}"/>
+                </a:ext>
+              </a:extLst>
+            </p:cNvPr>
+            <p:cNvSpPr txBox="1"/>
+            <p:nvPr/>
+          </p:nvSpPr>
+          <p:spPr>
+            <a:xfrm>
+              <a:off x="1091771" y="4879784"/>
+              <a:ext cx="287258" cy="184666"/>
+            </a:xfrm>
+            <a:prstGeom prst="rect">
+              <a:avLst/>
+            </a:prstGeom>
+            <a:noFill/>
+          </p:spPr>
+          <p:txBody>
+            <a:bodyPr wrap="none" rtlCol="0">
+              <a:spAutoFit/>
+            </a:bodyPr>
+            <a:lstStyle/>
+            <a:p>
+              <a:r>
+                <a:rPr lang="en-US" sz="600" dirty="0"/>
+                <a:t>Ma</a:t>
+              </a:r>
+            </a:p>
+          </p:txBody>
+        </p:sp>
+        <p:sp>
+          <p:nvSpPr>
+            <p:cNvPr id="229" name="TextBox 228">
+              <a:extLst>
+                <a:ext uri="{FF2B5EF4-FFF2-40B4-BE49-F238E27FC236}">
+                  <a16:creationId xmlns:a16="http://schemas.microsoft.com/office/drawing/2014/main" id="{7280181E-42D9-9D81-8EAC-1E04B9CC69E5}"/>
+                </a:ext>
+              </a:extLst>
+            </p:cNvPr>
+            <p:cNvSpPr txBox="1"/>
+            <p:nvPr/>
+          </p:nvSpPr>
+          <p:spPr>
+            <a:xfrm>
+              <a:off x="182996" y="4103901"/>
+              <a:ext cx="705642" cy="200055"/>
+            </a:xfrm>
+            <a:prstGeom prst="rect">
+              <a:avLst/>
+            </a:prstGeom>
+            <a:noFill/>
+          </p:spPr>
+          <p:txBody>
+            <a:bodyPr wrap="none" rtlCol="0">
+              <a:spAutoFit/>
+            </a:bodyPr>
+            <a:lstStyle/>
+            <a:p>
+              <a:r>
+                <a:rPr lang="en-US" sz="700" dirty="0"/>
+                <a:t>chronogram 2</a:t>
+              </a:r>
+            </a:p>
+          </p:txBody>
+        </p:sp>
+        <p:pic>
+          <p:nvPicPr>
+            <p:cNvPr id="432" name="Picture 431">
+              <a:extLst>
+                <a:ext uri="{FF2B5EF4-FFF2-40B4-BE49-F238E27FC236}">
+                  <a16:creationId xmlns:a16="http://schemas.microsoft.com/office/drawing/2014/main" id="{0A745390-EF97-322A-7FCA-6F8AE57F8A07}"/>
+                </a:ext>
+              </a:extLst>
+            </p:cNvPr>
+            <p:cNvPicPr>
+              <a:picLocks noChangeAspect="1"/>
+            </p:cNvPicPr>
+            <p:nvPr/>
+          </p:nvPicPr>
+          <p:blipFill rotWithShape="1">
+            <a:blip r:embed="rId27"/>
+            <a:srcRect b="30220"/>
+            <a:stretch/>
+          </p:blipFill>
+          <p:spPr>
+            <a:xfrm>
+              <a:off x="233818" y="4010690"/>
+              <a:ext cx="1709928" cy="875003"/>
+            </a:xfrm>
+            <a:prstGeom prst="rect">
+              <a:avLst/>
+            </a:prstGeom>
+          </p:spPr>
+        </p:pic>
+        <p:cxnSp>
+          <p:nvCxnSpPr>
+            <p:cNvPr id="366" name="Straight Connector 365">
+              <a:extLst>
+                <a:ext uri="{FF2B5EF4-FFF2-40B4-BE49-F238E27FC236}">
+                  <a16:creationId xmlns:a16="http://schemas.microsoft.com/office/drawing/2014/main" id="{CC0695F1-766E-5348-AFF5-B326D8912FC1}"/>
+                </a:ext>
+              </a:extLst>
+            </p:cNvPr>
+            <p:cNvCxnSpPr>
+              <a:cxnSpLocks/>
+            </p:cNvCxnSpPr>
+            <p:nvPr/>
+          </p:nvCxnSpPr>
+          <p:spPr>
+            <a:xfrm flipH="1">
+              <a:off x="259654" y="4588949"/>
+              <a:ext cx="563586" cy="0"/>
+            </a:xfrm>
+            <a:prstGeom prst="line">
+              <a:avLst/>
+            </a:prstGeom>
+            <a:ln w="12700">
+              <a:solidFill>
+                <a:srgbClr val="FFFFFF"/>
+              </a:solidFill>
+            </a:ln>
+          </p:spPr>
+          <p:style>
+            <a:lnRef idx="1">
+              <a:schemeClr val="accent1"/>
+            </a:lnRef>
+            <a:fillRef idx="0">
+              <a:schemeClr val="accent1"/>
+            </a:fillRef>
+            <a:effectRef idx="0">
+              <a:schemeClr val="accent1"/>
+            </a:effectRef>
+            <a:fontRef idx="minor">
+              <a:schemeClr val="tx1"/>
+            </a:fontRef>
+          </p:style>
+        </p:cxnSp>
+      </p:grpSp>
       <p:pic>
         <p:nvPicPr>
-          <p:cNvPr id="325" name="Picture 324">
+          <p:cNvPr id="396" name="Graphic 395">
             <a:extLst>
               <a:ext uri="{FF2B5EF4-FFF2-40B4-BE49-F238E27FC236}">
-                <a16:creationId xmlns:a16="http://schemas.microsoft.com/office/drawing/2014/main" id="{AE427555-9B32-ACE3-2420-4E3333AA4DCF}"/>
+                <a16:creationId xmlns:a16="http://schemas.microsoft.com/office/drawing/2014/main" id="{434B84E4-ED8E-8808-7DC1-F6063EAAC193}"/>
               </a:ext>
             </a:extLst>
           </p:cNvPr>
@@ -7219,770 +8353,289 @@
           <p:nvPr/>
         </p:nvPicPr>
         <p:blipFill rotWithShape="1">
-          <a:blip r:embed="rId13"/>
-          <a:srcRect b="30220"/>
+          <a:blip r:embed="rId6">
+            <a:extLst>
+              <a:ext uri="{96DAC541-7B7A-43D3-8B79-37D633B846F1}">
+                <asvg:svgBlip xmlns:asvg="http://schemas.microsoft.com/office/drawing/2016/SVG/main" r:embed="rId7"/>
+              </a:ext>
+            </a:extLst>
+          </a:blip>
+          <a:srcRect l="31113" t="85883" r="22652" b="2690"/>
           <a:stretch/>
         </p:blipFill>
         <p:spPr>
           <a:xfrm>
-            <a:off x="245541" y="3987244"/>
-            <a:ext cx="1709928" cy="875003"/>
+            <a:off x="1711569" y="7404941"/>
+            <a:ext cx="2368780" cy="277307"/>
           </a:xfrm>
           <a:prstGeom prst="rect">
             <a:avLst/>
           </a:prstGeom>
         </p:spPr>
       </p:pic>
-      <p:pic>
-        <p:nvPicPr>
-          <p:cNvPr id="326" name="Picture 325">
+      <p:sp>
+        <p:nvSpPr>
+          <p:cNvPr id="434" name="TextBox 433">
             <a:extLst>
               <a:ext uri="{FF2B5EF4-FFF2-40B4-BE49-F238E27FC236}">
-                <a16:creationId xmlns:a16="http://schemas.microsoft.com/office/drawing/2014/main" id="{3D8E5BE9-3E26-1A07-54F0-F19E6FC1BD83}"/>
+                <a16:creationId xmlns:a16="http://schemas.microsoft.com/office/drawing/2014/main" id="{3008F699-74CE-8B26-24F0-290516BBE5FD}"/>
               </a:ext>
             </a:extLst>
           </p:cNvPr>
-          <p:cNvPicPr>
-            <a:picLocks noChangeAspect="1"/>
-          </p:cNvPicPr>
+          <p:cNvSpPr txBox="1"/>
           <p:nvPr/>
-        </p:nvPicPr>
-        <p:blipFill rotWithShape="1">
-          <a:blip r:embed="rId14"/>
-          <a:srcRect t="71149" b="8852"/>
-          <a:stretch/>
-        </p:blipFill>
+        </p:nvSpPr>
         <p:spPr>
           <a:xfrm>
-            <a:off x="245375" y="4777170"/>
-            <a:ext cx="1709928" cy="250767"/>
+            <a:off x="3970435" y="7426139"/>
+            <a:ext cx="304892" cy="200055"/>
           </a:xfrm>
           <a:prstGeom prst="rect">
             <a:avLst/>
           </a:prstGeom>
+          <a:noFill/>
         </p:spPr>
-      </p:pic>
-      <p:pic>
-        <p:nvPicPr>
-          <p:cNvPr id="327" name="Picture 326">
+        <p:txBody>
+          <a:bodyPr wrap="none" rtlCol="0">
+            <a:spAutoFit/>
+          </a:bodyPr>
+          <a:lstStyle/>
+          <a:p>
+            <a:r>
+              <a:rPr lang="en-US" sz="700" dirty="0"/>
+              <a:t>Ma</a:t>
+            </a:r>
+          </a:p>
+        </p:txBody>
+      </p:sp>
+      <p:grpSp>
+        <p:nvGrpSpPr>
+          <p:cNvPr id="462" name="Group 461">
             <a:extLst>
               <a:ext uri="{FF2B5EF4-FFF2-40B4-BE49-F238E27FC236}">
-                <a16:creationId xmlns:a16="http://schemas.microsoft.com/office/drawing/2014/main" id="{657BBF80-9F86-ACDE-00D2-545E83751B45}"/>
+                <a16:creationId xmlns:a16="http://schemas.microsoft.com/office/drawing/2014/main" id="{B8EE0CCB-507E-261F-0B55-A32479B0672E}"/>
               </a:ext>
             </a:extLst>
           </p:cNvPr>
-          <p:cNvPicPr>
-            <a:picLocks noChangeAspect="1"/>
-          </p:cNvPicPr>
+          <p:cNvGrpSpPr/>
           <p:nvPr/>
-        </p:nvPicPr>
-        <p:blipFill rotWithShape="1">
-          <a:blip r:embed="rId15"/>
-          <a:srcRect b="29938"/>
-          <a:stretch/>
-        </p:blipFill>
-        <p:spPr>
+        </p:nvGrpSpPr>
+        <p:grpSpPr>
           <a:xfrm>
-            <a:off x="225865" y="2950000"/>
-            <a:ext cx="1709928" cy="878536"/>
+            <a:off x="3820915" y="1689874"/>
+            <a:ext cx="2129010" cy="1012194"/>
+            <a:chOff x="3820915" y="1689874"/>
+            <a:chExt cx="2129010" cy="1012194"/>
           </a:xfrm>
-          <a:prstGeom prst="rect">
-            <a:avLst/>
-          </a:prstGeom>
-        </p:spPr>
-      </p:pic>
-      <p:pic>
-        <p:nvPicPr>
-          <p:cNvPr id="328" name="Picture 327">
-            <a:extLst>
-              <a:ext uri="{FF2B5EF4-FFF2-40B4-BE49-F238E27FC236}">
-                <a16:creationId xmlns:a16="http://schemas.microsoft.com/office/drawing/2014/main" id="{96F9ADBF-EAA9-D6F3-F14B-66290CA20D82}"/>
-              </a:ext>
-            </a:extLst>
-          </p:cNvPr>
-          <p:cNvPicPr>
-            <a:picLocks noChangeAspect="1"/>
-          </p:cNvPicPr>
-          <p:nvPr/>
-        </p:nvPicPr>
-        <p:blipFill rotWithShape="1">
-          <a:blip r:embed="rId16"/>
-          <a:srcRect t="72162" b="7286"/>
-          <a:stretch/>
-        </p:blipFill>
-        <p:spPr>
-          <a:xfrm>
-            <a:off x="224889" y="3755692"/>
-            <a:ext cx="1709928" cy="257724"/>
-          </a:xfrm>
-          <a:prstGeom prst="rect">
-            <a:avLst/>
-          </a:prstGeom>
-        </p:spPr>
-      </p:pic>
-      <p:pic>
-        <p:nvPicPr>
-          <p:cNvPr id="332" name="Picture 331">
-            <a:extLst>
-              <a:ext uri="{FF2B5EF4-FFF2-40B4-BE49-F238E27FC236}">
-                <a16:creationId xmlns:a16="http://schemas.microsoft.com/office/drawing/2014/main" id="{296B98C6-E5E0-0EAB-C04A-F3EFBB033088}"/>
-              </a:ext>
-            </a:extLst>
-          </p:cNvPr>
-          <p:cNvPicPr>
-            <a:picLocks noChangeAspect="1"/>
-          </p:cNvPicPr>
-          <p:nvPr/>
-        </p:nvPicPr>
-        <p:blipFill rotWithShape="1">
-          <a:blip r:embed="rId17"/>
-          <a:srcRect t="11729" b="26838"/>
-          <a:stretch/>
-        </p:blipFill>
-        <p:spPr>
-          <a:xfrm>
-            <a:off x="4197731" y="1680062"/>
-            <a:ext cx="1691640" cy="762084"/>
-          </a:xfrm>
-          <a:prstGeom prst="rect">
-            <a:avLst/>
-          </a:prstGeom>
-        </p:spPr>
-      </p:pic>
-      <p:pic>
-        <p:nvPicPr>
-          <p:cNvPr id="335" name="Picture 334">
-            <a:extLst>
-              <a:ext uri="{FF2B5EF4-FFF2-40B4-BE49-F238E27FC236}">
-                <a16:creationId xmlns:a16="http://schemas.microsoft.com/office/drawing/2014/main" id="{A0D63741-9C39-5A2C-AFC8-DF7DC1AFCB1B}"/>
-              </a:ext>
-            </a:extLst>
-          </p:cNvPr>
-          <p:cNvPicPr>
-            <a:picLocks noChangeAspect="1"/>
-          </p:cNvPicPr>
-          <p:nvPr/>
-        </p:nvPicPr>
-        <p:blipFill rotWithShape="1">
-          <a:blip r:embed="rId18"/>
-          <a:srcRect b="20449"/>
-          <a:stretch/>
-        </p:blipFill>
-        <p:spPr>
-          <a:xfrm>
-            <a:off x="2167739" y="1535868"/>
-            <a:ext cx="1691640" cy="986858"/>
-          </a:xfrm>
-          <a:prstGeom prst="rect">
-            <a:avLst/>
-          </a:prstGeom>
-        </p:spPr>
-      </p:pic>
-      <p:pic>
-        <p:nvPicPr>
-          <p:cNvPr id="336" name="Picture 335">
-            <a:extLst>
-              <a:ext uri="{FF2B5EF4-FFF2-40B4-BE49-F238E27FC236}">
-                <a16:creationId xmlns:a16="http://schemas.microsoft.com/office/drawing/2014/main" id="{02728E80-D97E-F702-E73F-3673C2AF66DC}"/>
-              </a:ext>
-            </a:extLst>
-          </p:cNvPr>
-          <p:cNvPicPr>
-            <a:picLocks noChangeAspect="1"/>
-          </p:cNvPicPr>
-          <p:nvPr/>
-        </p:nvPicPr>
-        <p:blipFill rotWithShape="1">
-          <a:blip r:embed="rId19"/>
-          <a:srcRect t="69313"/>
-          <a:stretch/>
-        </p:blipFill>
-        <p:spPr>
-          <a:xfrm>
-            <a:off x="2167740" y="2266762"/>
-            <a:ext cx="1691640" cy="380690"/>
-          </a:xfrm>
-          <a:prstGeom prst="rect">
-            <a:avLst/>
-          </a:prstGeom>
-        </p:spPr>
-      </p:pic>
-      <p:pic>
-        <p:nvPicPr>
-          <p:cNvPr id="348" name="Picture 347">
-            <a:extLst>
-              <a:ext uri="{FF2B5EF4-FFF2-40B4-BE49-F238E27FC236}">
-                <a16:creationId xmlns:a16="http://schemas.microsoft.com/office/drawing/2014/main" id="{2AEF6BA7-11C7-A482-3D23-91ADADC3A2AD}"/>
-              </a:ext>
-            </a:extLst>
-          </p:cNvPr>
-          <p:cNvPicPr>
-            <a:picLocks noChangeAspect="1"/>
-          </p:cNvPicPr>
-          <p:nvPr/>
-        </p:nvPicPr>
-        <p:blipFill rotWithShape="1">
-          <a:blip r:embed="rId20"/>
-          <a:srcRect b="29699"/>
-          <a:stretch/>
-        </p:blipFill>
-        <p:spPr>
-          <a:xfrm>
-            <a:off x="2192925" y="2948170"/>
-            <a:ext cx="1719072" cy="886242"/>
-          </a:xfrm>
-          <a:prstGeom prst="rect">
-            <a:avLst/>
-          </a:prstGeom>
-        </p:spPr>
-      </p:pic>
-      <p:pic>
-        <p:nvPicPr>
-          <p:cNvPr id="349" name="Picture 348">
-            <a:extLst>
-              <a:ext uri="{FF2B5EF4-FFF2-40B4-BE49-F238E27FC236}">
-                <a16:creationId xmlns:a16="http://schemas.microsoft.com/office/drawing/2014/main" id="{3D8DF49E-7E84-EFD3-D70E-D6F15534398B}"/>
-              </a:ext>
-            </a:extLst>
-          </p:cNvPr>
-          <p:cNvPicPr>
-            <a:picLocks noChangeAspect="1"/>
-          </p:cNvPicPr>
-          <p:nvPr/>
-        </p:nvPicPr>
-        <p:blipFill rotWithShape="1">
-          <a:blip r:embed="rId21"/>
-          <a:srcRect t="70537" b="-1734"/>
-          <a:stretch/>
-        </p:blipFill>
-        <p:spPr>
-          <a:xfrm>
-            <a:off x="2192464" y="3751747"/>
-            <a:ext cx="1719072" cy="393293"/>
-          </a:xfrm>
-          <a:prstGeom prst="rect">
-            <a:avLst/>
-          </a:prstGeom>
-        </p:spPr>
-      </p:pic>
-      <p:pic>
-        <p:nvPicPr>
-          <p:cNvPr id="350" name="Picture 349">
-            <a:extLst>
-              <a:ext uri="{FF2B5EF4-FFF2-40B4-BE49-F238E27FC236}">
-                <a16:creationId xmlns:a16="http://schemas.microsoft.com/office/drawing/2014/main" id="{98BE78FA-8C0B-AE9E-6E8A-0A970298C5E7}"/>
-              </a:ext>
-            </a:extLst>
-          </p:cNvPr>
-          <p:cNvPicPr>
-            <a:picLocks noChangeAspect="1"/>
-          </p:cNvPicPr>
-          <p:nvPr/>
-        </p:nvPicPr>
-        <p:blipFill rotWithShape="1">
-          <a:blip r:embed="rId22"/>
-          <a:srcRect b="28672"/>
-          <a:stretch/>
-        </p:blipFill>
-        <p:spPr>
-          <a:xfrm>
-            <a:off x="2213316" y="4059492"/>
-            <a:ext cx="1719072" cy="899197"/>
-          </a:xfrm>
-          <a:prstGeom prst="rect">
-            <a:avLst/>
-          </a:prstGeom>
-        </p:spPr>
-      </p:pic>
-      <p:pic>
-        <p:nvPicPr>
-          <p:cNvPr id="354" name="Picture 353">
-            <a:extLst>
-              <a:ext uri="{FF2B5EF4-FFF2-40B4-BE49-F238E27FC236}">
-                <a16:creationId xmlns:a16="http://schemas.microsoft.com/office/drawing/2014/main" id="{17CA14A5-161C-564F-5AD8-0CFA9B753D5C}"/>
-              </a:ext>
-            </a:extLst>
-          </p:cNvPr>
-          <p:cNvPicPr>
-            <a:picLocks noChangeAspect="1"/>
-          </p:cNvPicPr>
-          <p:nvPr/>
-        </p:nvPicPr>
-        <p:blipFill rotWithShape="1">
-          <a:blip r:embed="rId23"/>
-          <a:srcRect t="73564" b="9191"/>
-          <a:stretch/>
-        </p:blipFill>
-        <p:spPr>
-          <a:xfrm>
-            <a:off x="4185519" y="3884347"/>
-            <a:ext cx="1719072" cy="217401"/>
-          </a:xfrm>
-          <a:prstGeom prst="rect">
-            <a:avLst/>
-          </a:prstGeom>
-        </p:spPr>
-      </p:pic>
-      <p:pic>
-        <p:nvPicPr>
-          <p:cNvPr id="355" name="Picture 354">
-            <a:extLst>
-              <a:ext uri="{FF2B5EF4-FFF2-40B4-BE49-F238E27FC236}">
-                <a16:creationId xmlns:a16="http://schemas.microsoft.com/office/drawing/2014/main" id="{891CEC6F-C89F-C9DF-C776-3AC9C3C303BA}"/>
-              </a:ext>
-            </a:extLst>
-          </p:cNvPr>
-          <p:cNvPicPr>
-            <a:picLocks noChangeAspect="1"/>
-          </p:cNvPicPr>
-          <p:nvPr/>
-        </p:nvPicPr>
-        <p:blipFill rotWithShape="1">
-          <a:blip r:embed="rId24"/>
-          <a:srcRect b="28891"/>
-          <a:stretch/>
-        </p:blipFill>
-        <p:spPr>
-          <a:xfrm>
-            <a:off x="4192142" y="4019016"/>
-            <a:ext cx="1719072" cy="896431"/>
-          </a:xfrm>
-          <a:prstGeom prst="rect">
-            <a:avLst/>
-          </a:prstGeom>
-        </p:spPr>
-      </p:pic>
-      <p:pic>
-        <p:nvPicPr>
-          <p:cNvPr id="356" name="Picture 355">
-            <a:extLst>
-              <a:ext uri="{FF2B5EF4-FFF2-40B4-BE49-F238E27FC236}">
-                <a16:creationId xmlns:a16="http://schemas.microsoft.com/office/drawing/2014/main" id="{779E21DA-3E94-BB10-4FDC-EE3149D8497D}"/>
-              </a:ext>
-            </a:extLst>
-          </p:cNvPr>
-          <p:cNvPicPr>
-            <a:picLocks noChangeAspect="1"/>
-          </p:cNvPicPr>
-          <p:nvPr/>
-        </p:nvPicPr>
-        <p:blipFill rotWithShape="1">
-          <a:blip r:embed="rId25"/>
-          <a:srcRect b="25316"/>
-          <a:stretch/>
-        </p:blipFill>
-        <p:spPr>
-          <a:xfrm>
-            <a:off x="4185519" y="3012189"/>
-            <a:ext cx="1719072" cy="941495"/>
-          </a:xfrm>
-          <a:prstGeom prst="rect">
-            <a:avLst/>
-          </a:prstGeom>
-        </p:spPr>
-      </p:pic>
-      <p:pic>
-        <p:nvPicPr>
-          <p:cNvPr id="357" name="Picture 356">
-            <a:extLst>
-              <a:ext uri="{FF2B5EF4-FFF2-40B4-BE49-F238E27FC236}">
-                <a16:creationId xmlns:a16="http://schemas.microsoft.com/office/drawing/2014/main" id="{06CCD8ED-AC29-09BB-8D70-0A7B214D67C8}"/>
-              </a:ext>
-            </a:extLst>
-          </p:cNvPr>
-          <p:cNvPicPr>
-            <a:picLocks noChangeAspect="1"/>
-          </p:cNvPicPr>
-          <p:nvPr/>
-        </p:nvPicPr>
-        <p:blipFill rotWithShape="1">
-          <a:blip r:embed="rId26"/>
-          <a:srcRect t="73753" b="8457"/>
-          <a:stretch/>
-        </p:blipFill>
-        <p:spPr>
-          <a:xfrm>
-            <a:off x="4192415" y="4851543"/>
-            <a:ext cx="1719072" cy="224262"/>
-          </a:xfrm>
-          <a:prstGeom prst="rect">
-            <a:avLst/>
-          </a:prstGeom>
-        </p:spPr>
-      </p:pic>
-      <p:pic>
-        <p:nvPicPr>
-          <p:cNvPr id="358" name="Picture 357">
-            <a:extLst>
-              <a:ext uri="{FF2B5EF4-FFF2-40B4-BE49-F238E27FC236}">
-                <a16:creationId xmlns:a16="http://schemas.microsoft.com/office/drawing/2014/main" id="{50FF4DD6-75D5-8C75-8397-E3999BBD6EB2}"/>
-              </a:ext>
-            </a:extLst>
-          </p:cNvPr>
-          <p:cNvPicPr>
-            <a:picLocks noChangeAspect="1"/>
-          </p:cNvPicPr>
-          <p:nvPr/>
-        </p:nvPicPr>
-        <p:blipFill rotWithShape="1">
-          <a:blip r:embed="rId27"/>
-          <a:srcRect t="77111"/>
-          <a:stretch/>
-        </p:blipFill>
-        <p:spPr>
-          <a:xfrm>
-            <a:off x="2211730" y="4857255"/>
-            <a:ext cx="1719072" cy="288552"/>
-          </a:xfrm>
-          <a:prstGeom prst="rect">
-            <a:avLst/>
-          </a:prstGeom>
-        </p:spPr>
-      </p:pic>
-      <p:cxnSp>
-        <p:nvCxnSpPr>
-          <p:cNvPr id="364" name="Straight Connector 363">
-            <a:extLst>
-              <a:ext uri="{FF2B5EF4-FFF2-40B4-BE49-F238E27FC236}">
-                <a16:creationId xmlns:a16="http://schemas.microsoft.com/office/drawing/2014/main" id="{B80AB933-5378-EEBD-9FB9-F14949561744}"/>
-              </a:ext>
-            </a:extLst>
-          </p:cNvPr>
-          <p:cNvCxnSpPr>
-            <a:cxnSpLocks/>
-          </p:cNvCxnSpPr>
-          <p:nvPr/>
-        </p:nvCxnSpPr>
-        <p:spPr>
-          <a:xfrm flipH="1">
-            <a:off x="245375" y="3527809"/>
-            <a:ext cx="607433" cy="0"/>
-          </a:xfrm>
-          <a:prstGeom prst="line">
-            <a:avLst/>
-          </a:prstGeom>
-          <a:ln w="12700">
-            <a:solidFill>
-              <a:srgbClr val="FFFFFF"/>
-            </a:solidFill>
-          </a:ln>
-        </p:spPr>
-        <p:style>
-          <a:lnRef idx="1">
-            <a:schemeClr val="accent1"/>
-          </a:lnRef>
-          <a:fillRef idx="0">
-            <a:schemeClr val="accent1"/>
-          </a:fillRef>
-          <a:effectRef idx="0">
-            <a:schemeClr val="accent1"/>
-          </a:effectRef>
-          <a:fontRef idx="minor">
-            <a:schemeClr val="tx1"/>
-          </a:fontRef>
-        </p:style>
-      </p:cxnSp>
-      <p:cxnSp>
-        <p:nvCxnSpPr>
-          <p:cNvPr id="366" name="Straight Connector 365">
-            <a:extLst>
-              <a:ext uri="{FF2B5EF4-FFF2-40B4-BE49-F238E27FC236}">
-                <a16:creationId xmlns:a16="http://schemas.microsoft.com/office/drawing/2014/main" id="{CC0695F1-766E-5348-AFF5-B326D8912FC1}"/>
-              </a:ext>
-            </a:extLst>
-          </p:cNvPr>
-          <p:cNvCxnSpPr>
-            <a:cxnSpLocks/>
-          </p:cNvCxnSpPr>
-          <p:nvPr/>
-        </p:nvCxnSpPr>
-        <p:spPr>
-          <a:xfrm flipH="1">
-            <a:off x="271377" y="4565503"/>
-            <a:ext cx="563586" cy="0"/>
-          </a:xfrm>
-          <a:prstGeom prst="line">
-            <a:avLst/>
-          </a:prstGeom>
-          <a:ln w="12700">
-            <a:solidFill>
-              <a:srgbClr val="FFFFFF"/>
-            </a:solidFill>
-          </a:ln>
-        </p:spPr>
-        <p:style>
-          <a:lnRef idx="1">
-            <a:schemeClr val="accent1"/>
-          </a:lnRef>
-          <a:fillRef idx="0">
-            <a:schemeClr val="accent1"/>
-          </a:fillRef>
-          <a:effectRef idx="0">
-            <a:schemeClr val="accent1"/>
-          </a:effectRef>
-          <a:fontRef idx="minor">
-            <a:schemeClr val="tx1"/>
-          </a:fontRef>
-        </p:style>
-      </p:cxnSp>
-      <p:cxnSp>
-        <p:nvCxnSpPr>
-          <p:cNvPr id="368" name="Straight Connector 367">
-            <a:extLst>
-              <a:ext uri="{FF2B5EF4-FFF2-40B4-BE49-F238E27FC236}">
-                <a16:creationId xmlns:a16="http://schemas.microsoft.com/office/drawing/2014/main" id="{0AC1AC17-F557-3DE1-1C83-883EF993E0FD}"/>
-              </a:ext>
-            </a:extLst>
-          </p:cNvPr>
-          <p:cNvCxnSpPr>
-            <a:cxnSpLocks/>
-          </p:cNvCxnSpPr>
-          <p:nvPr/>
-        </p:nvCxnSpPr>
-        <p:spPr>
-          <a:xfrm flipH="1">
-            <a:off x="2228489" y="4584553"/>
-            <a:ext cx="467055" cy="0"/>
-          </a:xfrm>
-          <a:prstGeom prst="line">
-            <a:avLst/>
-          </a:prstGeom>
-          <a:ln w="12700">
-            <a:solidFill>
-              <a:srgbClr val="FFFFFF"/>
-            </a:solidFill>
-          </a:ln>
-        </p:spPr>
-        <p:style>
-          <a:lnRef idx="1">
-            <a:schemeClr val="accent1"/>
-          </a:lnRef>
-          <a:fillRef idx="0">
-            <a:schemeClr val="accent1"/>
-          </a:fillRef>
-          <a:effectRef idx="0">
-            <a:schemeClr val="accent1"/>
-          </a:effectRef>
-          <a:fontRef idx="minor">
-            <a:schemeClr val="tx1"/>
-          </a:fontRef>
-        </p:style>
-      </p:cxnSp>
-      <p:cxnSp>
-        <p:nvCxnSpPr>
-          <p:cNvPr id="370" name="Straight Connector 369">
-            <a:extLst>
-              <a:ext uri="{FF2B5EF4-FFF2-40B4-BE49-F238E27FC236}">
-                <a16:creationId xmlns:a16="http://schemas.microsoft.com/office/drawing/2014/main" id="{9687EACA-A26B-5B64-FDDA-F2B706AC369F}"/>
-              </a:ext>
-            </a:extLst>
-          </p:cNvPr>
-          <p:cNvCxnSpPr>
-            <a:cxnSpLocks/>
-          </p:cNvCxnSpPr>
-          <p:nvPr/>
-        </p:nvCxnSpPr>
-        <p:spPr>
-          <a:xfrm flipH="1">
-            <a:off x="2199489" y="3527809"/>
-            <a:ext cx="467055" cy="0"/>
-          </a:xfrm>
-          <a:prstGeom prst="line">
-            <a:avLst/>
-          </a:prstGeom>
-          <a:ln w="12700">
-            <a:solidFill>
-              <a:srgbClr val="FFFFFF"/>
-            </a:solidFill>
-          </a:ln>
-        </p:spPr>
-        <p:style>
-          <a:lnRef idx="1">
-            <a:schemeClr val="accent1"/>
-          </a:lnRef>
-          <a:fillRef idx="0">
-            <a:schemeClr val="accent1"/>
-          </a:fillRef>
-          <a:effectRef idx="0">
-            <a:schemeClr val="accent1"/>
-          </a:effectRef>
-          <a:fontRef idx="minor">
-            <a:schemeClr val="tx1"/>
-          </a:fontRef>
-        </p:style>
-      </p:cxnSp>
-      <p:cxnSp>
-        <p:nvCxnSpPr>
-          <p:cNvPr id="371" name="Straight Connector 370">
-            <a:extLst>
-              <a:ext uri="{FF2B5EF4-FFF2-40B4-BE49-F238E27FC236}">
-                <a16:creationId xmlns:a16="http://schemas.microsoft.com/office/drawing/2014/main" id="{2D80C718-288D-C0E2-2A82-AE538DB72BCD}"/>
-              </a:ext>
-            </a:extLst>
-          </p:cNvPr>
-          <p:cNvCxnSpPr>
-            <a:cxnSpLocks/>
-          </p:cNvCxnSpPr>
-          <p:nvPr/>
-        </p:nvCxnSpPr>
-        <p:spPr>
-          <a:xfrm flipH="1">
-            <a:off x="4220889" y="4565503"/>
-            <a:ext cx="694551" cy="0"/>
-          </a:xfrm>
-          <a:prstGeom prst="line">
-            <a:avLst/>
-          </a:prstGeom>
-          <a:ln w="12700">
-            <a:solidFill>
-              <a:srgbClr val="FFFFFF"/>
-            </a:solidFill>
-          </a:ln>
-        </p:spPr>
-        <p:style>
-          <a:lnRef idx="1">
-            <a:schemeClr val="accent1"/>
-          </a:lnRef>
-          <a:fillRef idx="0">
-            <a:schemeClr val="accent1"/>
-          </a:fillRef>
-          <a:effectRef idx="0">
-            <a:schemeClr val="accent1"/>
-          </a:effectRef>
-          <a:fontRef idx="minor">
-            <a:schemeClr val="tx1"/>
-          </a:fontRef>
-        </p:style>
-      </p:cxnSp>
-      <p:cxnSp>
-        <p:nvCxnSpPr>
-          <p:cNvPr id="373" name="Straight Connector 372">
-            <a:extLst>
-              <a:ext uri="{FF2B5EF4-FFF2-40B4-BE49-F238E27FC236}">
-                <a16:creationId xmlns:a16="http://schemas.microsoft.com/office/drawing/2014/main" id="{B528E208-187C-F732-71BA-543A5F211C64}"/>
-              </a:ext>
-            </a:extLst>
-          </p:cNvPr>
-          <p:cNvCxnSpPr>
-            <a:cxnSpLocks/>
-          </p:cNvCxnSpPr>
-          <p:nvPr/>
-        </p:nvCxnSpPr>
-        <p:spPr>
-          <a:xfrm flipH="1">
-            <a:off x="4210324" y="3518969"/>
-            <a:ext cx="467055" cy="0"/>
-          </a:xfrm>
-          <a:prstGeom prst="line">
-            <a:avLst/>
-          </a:prstGeom>
-          <a:ln w="12700">
-            <a:solidFill>
-              <a:srgbClr val="FFFFFF"/>
-            </a:solidFill>
-          </a:ln>
-        </p:spPr>
-        <p:style>
-          <a:lnRef idx="1">
-            <a:schemeClr val="accent1"/>
-          </a:lnRef>
-          <a:fillRef idx="0">
-            <a:schemeClr val="accent1"/>
-          </a:fillRef>
-          <a:effectRef idx="0">
-            <a:schemeClr val="accent1"/>
-          </a:effectRef>
-          <a:fontRef idx="minor">
-            <a:schemeClr val="tx1"/>
-          </a:fontRef>
-        </p:style>
-      </p:cxnSp>
-      <p:cxnSp>
-        <p:nvCxnSpPr>
-          <p:cNvPr id="375" name="Straight Connector 374">
-            <a:extLst>
-              <a:ext uri="{FF2B5EF4-FFF2-40B4-BE49-F238E27FC236}">
-                <a16:creationId xmlns:a16="http://schemas.microsoft.com/office/drawing/2014/main" id="{3E0EDCAE-75F0-29B1-EB55-DE700BC9E969}"/>
-              </a:ext>
-            </a:extLst>
-          </p:cNvPr>
-          <p:cNvCxnSpPr>
-            <a:cxnSpLocks/>
-          </p:cNvCxnSpPr>
-          <p:nvPr/>
-        </p:nvCxnSpPr>
-        <p:spPr>
-          <a:xfrm flipH="1">
-            <a:off x="4196555" y="2051579"/>
-            <a:ext cx="45720" cy="0"/>
-          </a:xfrm>
-          <a:prstGeom prst="line">
-            <a:avLst/>
-          </a:prstGeom>
-          <a:ln w="12700">
-            <a:solidFill>
-              <a:srgbClr val="FFFFFF"/>
-            </a:solidFill>
-          </a:ln>
-        </p:spPr>
-        <p:style>
-          <a:lnRef idx="1">
-            <a:schemeClr val="accent1"/>
-          </a:lnRef>
-          <a:fillRef idx="0">
-            <a:schemeClr val="accent1"/>
-          </a:fillRef>
-          <a:effectRef idx="0">
-            <a:schemeClr val="accent1"/>
-          </a:effectRef>
-          <a:fontRef idx="minor">
-            <a:schemeClr val="tx1"/>
-          </a:fontRef>
-        </p:style>
-      </p:cxnSp>
-      <p:cxnSp>
-        <p:nvCxnSpPr>
-          <p:cNvPr id="376" name="Straight Connector 375">
-            <a:extLst>
-              <a:ext uri="{FF2B5EF4-FFF2-40B4-BE49-F238E27FC236}">
-                <a16:creationId xmlns:a16="http://schemas.microsoft.com/office/drawing/2014/main" id="{011C3562-0C70-291C-62EE-A320155BB6B3}"/>
-              </a:ext>
-            </a:extLst>
-          </p:cNvPr>
-          <p:cNvCxnSpPr>
-            <a:cxnSpLocks/>
-          </p:cNvCxnSpPr>
-          <p:nvPr/>
-        </p:nvCxnSpPr>
-        <p:spPr>
-          <a:xfrm flipH="1">
-            <a:off x="2164564" y="1931686"/>
-            <a:ext cx="573117" cy="0"/>
-          </a:xfrm>
-          <a:prstGeom prst="line">
-            <a:avLst/>
-          </a:prstGeom>
-          <a:ln w="12700">
-            <a:solidFill>
-              <a:srgbClr val="FFFFFF"/>
-            </a:solidFill>
-          </a:ln>
-        </p:spPr>
-        <p:style>
-          <a:lnRef idx="1">
-            <a:schemeClr val="accent1"/>
-          </a:lnRef>
-          <a:fillRef idx="0">
-            <a:schemeClr val="accent1"/>
-          </a:fillRef>
-          <a:effectRef idx="0">
-            <a:schemeClr val="accent1"/>
-          </a:effectRef>
-          <a:fontRef idx="minor">
-            <a:schemeClr val="tx1"/>
-          </a:fontRef>
-        </p:style>
-      </p:cxnSp>
+        </p:grpSpPr>
+        <p:grpSp>
+          <p:nvGrpSpPr>
+            <p:cNvPr id="454" name="Group 453">
+              <a:extLst>
+                <a:ext uri="{FF2B5EF4-FFF2-40B4-BE49-F238E27FC236}">
+                  <a16:creationId xmlns:a16="http://schemas.microsoft.com/office/drawing/2014/main" id="{ABDBE942-7ACC-4302-63B8-3A5B327D50C6}"/>
+                </a:ext>
+              </a:extLst>
+            </p:cNvPr>
+            <p:cNvGrpSpPr/>
+            <p:nvPr/>
+          </p:nvGrpSpPr>
+          <p:grpSpPr>
+            <a:xfrm>
+              <a:off x="3820915" y="1689874"/>
+              <a:ext cx="2129010" cy="1012194"/>
+              <a:chOff x="3801638" y="1766969"/>
+              <a:chExt cx="2129010" cy="1012194"/>
+            </a:xfrm>
+          </p:grpSpPr>
+          <p:grpSp>
+            <p:nvGrpSpPr>
+              <p:cNvPr id="455" name="Group 454">
+                <a:extLst>
+                  <a:ext uri="{FF2B5EF4-FFF2-40B4-BE49-F238E27FC236}">
+                    <a16:creationId xmlns:a16="http://schemas.microsoft.com/office/drawing/2014/main" id="{A71BA9DE-E758-4069-D80B-740D6D18F2D9}"/>
+                  </a:ext>
+                </a:extLst>
+              </p:cNvPr>
+              <p:cNvGrpSpPr/>
+              <p:nvPr/>
+            </p:nvGrpSpPr>
+            <p:grpSpPr>
+              <a:xfrm>
+                <a:off x="3801638" y="1766969"/>
+                <a:ext cx="2129010" cy="1012194"/>
+                <a:chOff x="3801638" y="1766969"/>
+                <a:chExt cx="2129010" cy="1012194"/>
+              </a:xfrm>
+            </p:grpSpPr>
+            <p:pic>
+              <p:nvPicPr>
+                <p:cNvPr id="457" name="Picture 456">
+                  <a:extLst>
+                    <a:ext uri="{FF2B5EF4-FFF2-40B4-BE49-F238E27FC236}">
+                      <a16:creationId xmlns:a16="http://schemas.microsoft.com/office/drawing/2014/main" id="{30A3792B-10D2-A411-35FD-523BA8C6B0F3}"/>
+                    </a:ext>
+                  </a:extLst>
+                </p:cNvPr>
+                <p:cNvPicPr>
+                  <a:picLocks noChangeAspect="1"/>
+                </p:cNvPicPr>
+                <p:nvPr/>
+              </p:nvPicPr>
+              <p:blipFill rotWithShape="1">
+                <a:blip r:embed="rId13"/>
+                <a:srcRect l="-21342" t="74454" r="21342" b="-3777"/>
+                <a:stretch/>
+              </p:blipFill>
+              <p:spPr>
+                <a:xfrm>
+                  <a:off x="3801638" y="2409831"/>
+                  <a:ext cx="1753703" cy="369332"/>
+                </a:xfrm>
+                <a:prstGeom prst="rect">
+                  <a:avLst/>
+                </a:prstGeom>
+              </p:spPr>
+            </p:pic>
+            <p:pic>
+              <p:nvPicPr>
+                <p:cNvPr id="459" name="Picture 458">
+                  <a:extLst>
+                    <a:ext uri="{FF2B5EF4-FFF2-40B4-BE49-F238E27FC236}">
+                      <a16:creationId xmlns:a16="http://schemas.microsoft.com/office/drawing/2014/main" id="{863FEF76-2816-E7E7-5F33-B442D9011E4D}"/>
+                    </a:ext>
+                  </a:extLst>
+                </p:cNvPr>
+                <p:cNvPicPr>
+                  <a:picLocks noChangeAspect="1"/>
+                </p:cNvPicPr>
+                <p:nvPr/>
+              </p:nvPicPr>
+              <p:blipFill rotWithShape="1">
+                <a:blip r:embed="rId28"/>
+                <a:srcRect t="7494" b="52685"/>
+                <a:stretch/>
+              </p:blipFill>
+              <p:spPr>
+                <a:xfrm>
+                  <a:off x="4176944" y="1766969"/>
+                  <a:ext cx="1753704" cy="493975"/>
+                </a:xfrm>
+                <a:prstGeom prst="rect">
+                  <a:avLst/>
+                </a:prstGeom>
+              </p:spPr>
+            </p:pic>
+            <p:sp>
+              <p:nvSpPr>
+                <p:cNvPr id="460" name="TextBox 459">
+                  <a:extLst>
+                    <a:ext uri="{FF2B5EF4-FFF2-40B4-BE49-F238E27FC236}">
+                      <a16:creationId xmlns:a16="http://schemas.microsoft.com/office/drawing/2014/main" id="{CC63B5B3-5E3D-463B-785D-39D890B8D4F3}"/>
+                    </a:ext>
+                  </a:extLst>
+                </p:cNvPr>
+                <p:cNvSpPr txBox="1"/>
+                <p:nvPr/>
+              </p:nvSpPr>
+              <p:spPr>
+                <a:xfrm>
+                  <a:off x="5052963" y="2438703"/>
+                  <a:ext cx="287258" cy="184666"/>
+                </a:xfrm>
+                <a:prstGeom prst="rect">
+                  <a:avLst/>
+                </a:prstGeom>
+                <a:noFill/>
+              </p:spPr>
+              <p:txBody>
+                <a:bodyPr wrap="none" rtlCol="0">
+                  <a:spAutoFit/>
+                </a:bodyPr>
+                <a:lstStyle/>
+                <a:p>
+                  <a:r>
+                    <a:rPr lang="en-US" sz="600" dirty="0"/>
+                    <a:t>Ma</a:t>
+                  </a:r>
+                </a:p>
+              </p:txBody>
+            </p:sp>
+          </p:grpSp>
+          <p:cxnSp>
+            <p:nvCxnSpPr>
+              <p:cNvPr id="456" name="Straight Connector 455">
+                <a:extLst>
+                  <a:ext uri="{FF2B5EF4-FFF2-40B4-BE49-F238E27FC236}">
+                    <a16:creationId xmlns:a16="http://schemas.microsoft.com/office/drawing/2014/main" id="{2A30C23A-2B05-E3B7-2D61-BA6F3462D4F7}"/>
+                  </a:ext>
+                </a:extLst>
+              </p:cNvPr>
+              <p:cNvCxnSpPr>
+                <a:cxnSpLocks/>
+              </p:cNvCxnSpPr>
+              <p:nvPr/>
+            </p:nvCxnSpPr>
+            <p:spPr>
+              <a:xfrm flipH="1">
+                <a:off x="4177505" y="2194454"/>
+                <a:ext cx="45720" cy="0"/>
+              </a:xfrm>
+              <a:prstGeom prst="line">
+                <a:avLst/>
+              </a:prstGeom>
+              <a:ln w="12700">
+                <a:solidFill>
+                  <a:srgbClr val="FFFFFF"/>
+                </a:solidFill>
+              </a:ln>
+            </p:spPr>
+            <p:style>
+              <a:lnRef idx="1">
+                <a:schemeClr val="accent1"/>
+              </a:lnRef>
+              <a:fillRef idx="0">
+                <a:schemeClr val="accent1"/>
+              </a:fillRef>
+              <a:effectRef idx="0">
+                <a:schemeClr val="accent1"/>
+              </a:effectRef>
+              <a:fontRef idx="minor">
+                <a:schemeClr val="tx1"/>
+              </a:fontRef>
+            </p:style>
+          </p:cxnSp>
+        </p:grpSp>
+        <p:pic>
+          <p:nvPicPr>
+            <p:cNvPr id="461" name="Picture 460">
+              <a:extLst>
+                <a:ext uri="{FF2B5EF4-FFF2-40B4-BE49-F238E27FC236}">
+                  <a16:creationId xmlns:a16="http://schemas.microsoft.com/office/drawing/2014/main" id="{EC156EEE-8688-345D-4D1B-8F67219D3E0D}"/>
+                </a:ext>
+              </a:extLst>
+            </p:cNvPr>
+            <p:cNvPicPr>
+              <a:picLocks noChangeAspect="1"/>
+            </p:cNvPicPr>
+            <p:nvPr/>
+          </p:nvPicPr>
+          <p:blipFill rotWithShape="1">
+            <a:blip r:embed="rId29"/>
+            <a:srcRect t="45643" b="26838"/>
+            <a:stretch/>
+          </p:blipFill>
+          <p:spPr>
+            <a:xfrm>
+              <a:off x="4196220" y="2014150"/>
+              <a:ext cx="1753703" cy="341375"/>
+            </a:xfrm>
+            <a:prstGeom prst="rect">
+              <a:avLst/>
+            </a:prstGeom>
+          </p:spPr>
+        </p:pic>
+      </p:grpSp>
     </p:spTree>
     <p:extLst>
       <p:ext uri="{BB962C8B-B14F-4D97-AF65-F5344CB8AC3E}">

</xml_diff>